<commit_message>
model update WhileLoop RepeatLoop Various UI fixes
</commit_message>
<xml_diff>
--- a/doc/Presentation.pptx
+++ b/doc/Presentation.pptx
@@ -259,7 +259,7 @@
           <a:p>
             <a:fld id="{C44077DE-86EB-4760-86BD-09F56F36472D}" type="datetimeFigureOut">
               <a:rPr lang="en-US" smtClean="0"/>
-              <a:t>12/9/2022</a:t>
+              <a:t>12/26/2022</a:t>
             </a:fld>
             <a:endParaRPr lang="en-US"/>
           </a:p>
@@ -457,7 +457,7 @@
           <a:p>
             <a:fld id="{C44077DE-86EB-4760-86BD-09F56F36472D}" type="datetimeFigureOut">
               <a:rPr lang="en-US" smtClean="0"/>
-              <a:t>12/9/2022</a:t>
+              <a:t>12/26/2022</a:t>
             </a:fld>
             <a:endParaRPr lang="en-US"/>
           </a:p>
@@ -665,7 +665,7 @@
           <a:p>
             <a:fld id="{C44077DE-86EB-4760-86BD-09F56F36472D}" type="datetimeFigureOut">
               <a:rPr lang="en-US" smtClean="0"/>
-              <a:t>12/9/2022</a:t>
+              <a:t>12/26/2022</a:t>
             </a:fld>
             <a:endParaRPr lang="en-US"/>
           </a:p>
@@ -863,7 +863,7 @@
           <a:p>
             <a:fld id="{C44077DE-86EB-4760-86BD-09F56F36472D}" type="datetimeFigureOut">
               <a:rPr lang="en-US" smtClean="0"/>
-              <a:t>12/9/2022</a:t>
+              <a:t>12/26/2022</a:t>
             </a:fld>
             <a:endParaRPr lang="en-US"/>
           </a:p>
@@ -1138,7 +1138,7 @@
           <a:p>
             <a:fld id="{C44077DE-86EB-4760-86BD-09F56F36472D}" type="datetimeFigureOut">
               <a:rPr lang="en-US" smtClean="0"/>
-              <a:t>12/9/2022</a:t>
+              <a:t>12/26/2022</a:t>
             </a:fld>
             <a:endParaRPr lang="en-US"/>
           </a:p>
@@ -1403,7 +1403,7 @@
           <a:p>
             <a:fld id="{C44077DE-86EB-4760-86BD-09F56F36472D}" type="datetimeFigureOut">
               <a:rPr lang="en-US" smtClean="0"/>
-              <a:t>12/9/2022</a:t>
+              <a:t>12/26/2022</a:t>
             </a:fld>
             <a:endParaRPr lang="en-US"/>
           </a:p>
@@ -1815,7 +1815,7 @@
           <a:p>
             <a:fld id="{C44077DE-86EB-4760-86BD-09F56F36472D}" type="datetimeFigureOut">
               <a:rPr lang="en-US" smtClean="0"/>
-              <a:t>12/9/2022</a:t>
+              <a:t>12/26/2022</a:t>
             </a:fld>
             <a:endParaRPr lang="en-US"/>
           </a:p>
@@ -1956,7 +1956,7 @@
           <a:p>
             <a:fld id="{C44077DE-86EB-4760-86BD-09F56F36472D}" type="datetimeFigureOut">
               <a:rPr lang="en-US" smtClean="0"/>
-              <a:t>12/9/2022</a:t>
+              <a:t>12/26/2022</a:t>
             </a:fld>
             <a:endParaRPr lang="en-US"/>
           </a:p>
@@ -2069,7 +2069,7 @@
           <a:p>
             <a:fld id="{C44077DE-86EB-4760-86BD-09F56F36472D}" type="datetimeFigureOut">
               <a:rPr lang="en-US" smtClean="0"/>
-              <a:t>12/9/2022</a:t>
+              <a:t>12/26/2022</a:t>
             </a:fld>
             <a:endParaRPr lang="en-US"/>
           </a:p>
@@ -2380,7 +2380,7 @@
           <a:p>
             <a:fld id="{C44077DE-86EB-4760-86BD-09F56F36472D}" type="datetimeFigureOut">
               <a:rPr lang="en-US" smtClean="0"/>
-              <a:t>12/9/2022</a:t>
+              <a:t>12/26/2022</a:t>
             </a:fld>
             <a:endParaRPr lang="en-US"/>
           </a:p>
@@ -2668,7 +2668,7 @@
           <a:p>
             <a:fld id="{C44077DE-86EB-4760-86BD-09F56F36472D}" type="datetimeFigureOut">
               <a:rPr lang="en-US" smtClean="0"/>
-              <a:t>12/9/2022</a:t>
+              <a:t>12/26/2022</a:t>
             </a:fld>
             <a:endParaRPr lang="en-US"/>
           </a:p>
@@ -2909,7 +2909,7 @@
           <a:p>
             <a:fld id="{C44077DE-86EB-4760-86BD-09F56F36472D}" type="datetimeFigureOut">
               <a:rPr lang="en-US" smtClean="0"/>
-              <a:t>12/9/2022</a:t>
+              <a:t>12/26/2022</a:t>
             </a:fld>
             <a:endParaRPr lang="en-US"/>
           </a:p>
@@ -4157,7 +4157,7 @@
         </p:nvCxnSpPr>
         <p:spPr>
           <a:xfrm flipH="1">
-            <a:off x="9714491" y="2124248"/>
+            <a:off x="9714491" y="-18874"/>
             <a:ext cx="1331" cy="3221711"/>
           </a:xfrm>
           <a:prstGeom prst="straightConnector1">
@@ -4195,7 +4195,7 @@
         </p:nvCxnSpPr>
         <p:spPr>
           <a:xfrm flipH="1">
-            <a:off x="7989193" y="3745420"/>
+            <a:off x="7989193" y="1602298"/>
             <a:ext cx="3424664" cy="0"/>
           </a:xfrm>
           <a:prstGeom prst="straightConnector1">
@@ -4231,7 +4231,7 @@
         </p:nvSpPr>
         <p:spPr>
           <a:xfrm>
-            <a:off x="8787125" y="3132772"/>
+            <a:off x="8787125" y="989650"/>
             <a:ext cx="1828800" cy="1225296"/>
           </a:xfrm>
           <a:prstGeom prst="flowChartDecision">
@@ -4275,7 +4275,7 @@
         </p:nvSpPr>
         <p:spPr>
           <a:xfrm>
-            <a:off x="9472049" y="3356773"/>
+            <a:off x="9472049" y="1213651"/>
             <a:ext cx="779435" cy="707886"/>
           </a:xfrm>
           <a:prstGeom prst="rect">
@@ -4293,6 +4293,162 @@
             <a:r>
               <a:rPr lang="en-US" sz="4000" dirty="0"/>
               <a:t>IF</a:t>
+            </a:r>
+          </a:p>
+        </p:txBody>
+      </p:sp>
+      <p:cxnSp>
+        <p:nvCxnSpPr>
+          <p:cNvPr id="14" name="Straight Arrow Connector 13">
+            <a:extLst>
+              <a:ext uri="{FF2B5EF4-FFF2-40B4-BE49-F238E27FC236}">
+                <a16:creationId xmlns:a16="http://schemas.microsoft.com/office/drawing/2014/main" id="{938023AD-2B37-44B5-B895-08923EA07627}"/>
+              </a:ext>
+            </a:extLst>
+          </p:cNvPr>
+          <p:cNvCxnSpPr>
+            <a:cxnSpLocks/>
+          </p:cNvCxnSpPr>
+          <p:nvPr/>
+        </p:nvCxnSpPr>
+        <p:spPr>
+          <a:xfrm flipH="1">
+            <a:off x="9866891" y="3558850"/>
+            <a:ext cx="1331" cy="3221711"/>
+          </a:xfrm>
+          <a:prstGeom prst="straightConnector1">
+            <a:avLst/>
+          </a:prstGeom>
+        </p:spPr>
+        <p:style>
+          <a:lnRef idx="2">
+            <a:schemeClr val="dk1"/>
+          </a:lnRef>
+          <a:fillRef idx="0">
+            <a:schemeClr val="dk1"/>
+          </a:fillRef>
+          <a:effectRef idx="1">
+            <a:schemeClr val="dk1"/>
+          </a:effectRef>
+          <a:fontRef idx="minor">
+            <a:schemeClr val="tx1"/>
+          </a:fontRef>
+        </p:style>
+      </p:cxnSp>
+      <p:cxnSp>
+        <p:nvCxnSpPr>
+          <p:cNvPr id="15" name="Straight Arrow Connector 14">
+            <a:extLst>
+              <a:ext uri="{FF2B5EF4-FFF2-40B4-BE49-F238E27FC236}">
+                <a16:creationId xmlns:a16="http://schemas.microsoft.com/office/drawing/2014/main" id="{E58D0140-56C9-42E6-B2EE-685806EB7765}"/>
+              </a:ext>
+            </a:extLst>
+          </p:cNvPr>
+          <p:cNvCxnSpPr>
+            <a:cxnSpLocks/>
+          </p:cNvCxnSpPr>
+          <p:nvPr/>
+        </p:nvCxnSpPr>
+        <p:spPr>
+          <a:xfrm flipH="1">
+            <a:off x="8141593" y="5180022"/>
+            <a:ext cx="3424664" cy="0"/>
+          </a:xfrm>
+          <a:prstGeom prst="straightConnector1">
+            <a:avLst/>
+          </a:prstGeom>
+        </p:spPr>
+        <p:style>
+          <a:lnRef idx="2">
+            <a:schemeClr val="dk1"/>
+          </a:lnRef>
+          <a:fillRef idx="0">
+            <a:schemeClr val="dk1"/>
+          </a:fillRef>
+          <a:effectRef idx="1">
+            <a:schemeClr val="dk1"/>
+          </a:effectRef>
+          <a:fontRef idx="minor">
+            <a:schemeClr val="tx1"/>
+          </a:fontRef>
+        </p:style>
+      </p:cxnSp>
+      <p:sp>
+        <p:nvSpPr>
+          <p:cNvPr id="17" name="Flowchart: Decision 16">
+            <a:extLst>
+              <a:ext uri="{FF2B5EF4-FFF2-40B4-BE49-F238E27FC236}">
+                <a16:creationId xmlns:a16="http://schemas.microsoft.com/office/drawing/2014/main" id="{D1D937C6-6960-44AF-B040-E59F354A795B}"/>
+              </a:ext>
+            </a:extLst>
+          </p:cNvPr>
+          <p:cNvSpPr/>
+          <p:nvPr/>
+        </p:nvSpPr>
+        <p:spPr>
+          <a:xfrm>
+            <a:off x="8939525" y="4567374"/>
+            <a:ext cx="1828800" cy="1225296"/>
+          </a:xfrm>
+          <a:prstGeom prst="flowChartDecision">
+            <a:avLst/>
+          </a:prstGeom>
+        </p:spPr>
+        <p:style>
+          <a:lnRef idx="2">
+            <a:schemeClr val="dk1"/>
+          </a:lnRef>
+          <a:fillRef idx="1">
+            <a:schemeClr val="lt1"/>
+          </a:fillRef>
+          <a:effectRef idx="0">
+            <a:schemeClr val="dk1"/>
+          </a:effectRef>
+          <a:fontRef idx="minor">
+            <a:schemeClr val="dk1"/>
+          </a:fontRef>
+        </p:style>
+        <p:txBody>
+          <a:bodyPr rtlCol="0" anchor="ctr"/>
+          <a:lstStyle/>
+          <a:p>
+            <a:pPr algn="ctr"/>
+            <a:endParaRPr lang="en-US"/>
+          </a:p>
+        </p:txBody>
+      </p:sp>
+      <p:sp>
+        <p:nvSpPr>
+          <p:cNvPr id="27" name="TextBox 26">
+            <a:extLst>
+              <a:ext uri="{FF2B5EF4-FFF2-40B4-BE49-F238E27FC236}">
+                <a16:creationId xmlns:a16="http://schemas.microsoft.com/office/drawing/2014/main" id="{63F8C744-654F-43D5-AA9B-7611CF512144}"/>
+              </a:ext>
+            </a:extLst>
+          </p:cNvPr>
+          <p:cNvSpPr txBox="1"/>
+          <p:nvPr/>
+        </p:nvSpPr>
+        <p:spPr>
+          <a:xfrm>
+            <a:off x="9213605" y="4882960"/>
+            <a:ext cx="1263547" cy="538609"/>
+          </a:xfrm>
+          <a:prstGeom prst="rect">
+            <a:avLst/>
+          </a:prstGeom>
+          <a:noFill/>
+        </p:spPr>
+        <p:txBody>
+          <a:bodyPr wrap="square" rtlCol="0">
+            <a:spAutoFit/>
+          </a:bodyPr>
+          <a:lstStyle/>
+          <a:p>
+            <a:pPr algn="ctr"/>
+            <a:r>
+              <a:rPr lang="en-US" sz="2900" dirty="0"/>
+              <a:t>Repeat</a:t>
             </a:r>
           </a:p>
         </p:txBody>

</xml_diff>

<commit_message>
moe.umlgui.ui.tree Model update Further UI fixes
</commit_message>
<xml_diff>
--- a/doc/Presentation.pptx
+++ b/doc/Presentation.pptx
@@ -10,7 +10,8 @@
     <p:sldId id="257" r:id="rId4"/>
     <p:sldId id="260" r:id="rId5"/>
     <p:sldId id="259" r:id="rId6"/>
-    <p:sldId id="261" r:id="rId7"/>
+    <p:sldId id="262" r:id="rId7"/>
+    <p:sldId id="261" r:id="rId8"/>
   </p:sldIdLst>
   <p:sldSz cx="12192000" cy="6858000"/>
   <p:notesSz cx="6858000" cy="9144000"/>
@@ -259,7 +260,7 @@
           <a:p>
             <a:fld id="{C44077DE-86EB-4760-86BD-09F56F36472D}" type="datetimeFigureOut">
               <a:rPr lang="en-US" smtClean="0"/>
-              <a:t>12/26/2022</a:t>
+              <a:t>12/30/2022</a:t>
             </a:fld>
             <a:endParaRPr lang="en-US"/>
           </a:p>
@@ -457,7 +458,7 @@
           <a:p>
             <a:fld id="{C44077DE-86EB-4760-86BD-09F56F36472D}" type="datetimeFigureOut">
               <a:rPr lang="en-US" smtClean="0"/>
-              <a:t>12/26/2022</a:t>
+              <a:t>12/30/2022</a:t>
             </a:fld>
             <a:endParaRPr lang="en-US"/>
           </a:p>
@@ -665,7 +666,7 @@
           <a:p>
             <a:fld id="{C44077DE-86EB-4760-86BD-09F56F36472D}" type="datetimeFigureOut">
               <a:rPr lang="en-US" smtClean="0"/>
-              <a:t>12/26/2022</a:t>
+              <a:t>12/30/2022</a:t>
             </a:fld>
             <a:endParaRPr lang="en-US"/>
           </a:p>
@@ -863,7 +864,7 @@
           <a:p>
             <a:fld id="{C44077DE-86EB-4760-86BD-09F56F36472D}" type="datetimeFigureOut">
               <a:rPr lang="en-US" smtClean="0"/>
-              <a:t>12/26/2022</a:t>
+              <a:t>12/30/2022</a:t>
             </a:fld>
             <a:endParaRPr lang="en-US"/>
           </a:p>
@@ -1138,7 +1139,7 @@
           <a:p>
             <a:fld id="{C44077DE-86EB-4760-86BD-09F56F36472D}" type="datetimeFigureOut">
               <a:rPr lang="en-US" smtClean="0"/>
-              <a:t>12/26/2022</a:t>
+              <a:t>12/30/2022</a:t>
             </a:fld>
             <a:endParaRPr lang="en-US"/>
           </a:p>
@@ -1403,7 +1404,7 @@
           <a:p>
             <a:fld id="{C44077DE-86EB-4760-86BD-09F56F36472D}" type="datetimeFigureOut">
               <a:rPr lang="en-US" smtClean="0"/>
-              <a:t>12/26/2022</a:t>
+              <a:t>12/30/2022</a:t>
             </a:fld>
             <a:endParaRPr lang="en-US"/>
           </a:p>
@@ -1815,7 +1816,7 @@
           <a:p>
             <a:fld id="{C44077DE-86EB-4760-86BD-09F56F36472D}" type="datetimeFigureOut">
               <a:rPr lang="en-US" smtClean="0"/>
-              <a:t>12/26/2022</a:t>
+              <a:t>12/30/2022</a:t>
             </a:fld>
             <a:endParaRPr lang="en-US"/>
           </a:p>
@@ -1956,7 +1957,7 @@
           <a:p>
             <a:fld id="{C44077DE-86EB-4760-86BD-09F56F36472D}" type="datetimeFigureOut">
               <a:rPr lang="en-US" smtClean="0"/>
-              <a:t>12/26/2022</a:t>
+              <a:t>12/30/2022</a:t>
             </a:fld>
             <a:endParaRPr lang="en-US"/>
           </a:p>
@@ -2069,7 +2070,7 @@
           <a:p>
             <a:fld id="{C44077DE-86EB-4760-86BD-09F56F36472D}" type="datetimeFigureOut">
               <a:rPr lang="en-US" smtClean="0"/>
-              <a:t>12/26/2022</a:t>
+              <a:t>12/30/2022</a:t>
             </a:fld>
             <a:endParaRPr lang="en-US"/>
           </a:p>
@@ -2380,7 +2381,7 @@
           <a:p>
             <a:fld id="{C44077DE-86EB-4760-86BD-09F56F36472D}" type="datetimeFigureOut">
               <a:rPr lang="en-US" smtClean="0"/>
-              <a:t>12/26/2022</a:t>
+              <a:t>12/30/2022</a:t>
             </a:fld>
             <a:endParaRPr lang="en-US"/>
           </a:p>
@@ -2668,7 +2669,7 @@
           <a:p>
             <a:fld id="{C44077DE-86EB-4760-86BD-09F56F36472D}" type="datetimeFigureOut">
               <a:rPr lang="en-US" smtClean="0"/>
-              <a:t>12/26/2022</a:t>
+              <a:t>12/30/2022</a:t>
             </a:fld>
             <a:endParaRPr lang="en-US"/>
           </a:p>
@@ -2909,7 +2910,7 @@
           <a:p>
             <a:fld id="{C44077DE-86EB-4760-86BD-09F56F36472D}" type="datetimeFigureOut">
               <a:rPr lang="en-US" smtClean="0"/>
-              <a:t>12/26/2022</a:t>
+              <a:t>12/30/2022</a:t>
             </a:fld>
             <a:endParaRPr lang="en-US"/>
           </a:p>
@@ -4483,6 +4484,535 @@
           <a:chExt cx="0" cy="0"/>
         </a:xfrm>
       </p:grpSpPr>
+      <p:cxnSp>
+        <p:nvCxnSpPr>
+          <p:cNvPr id="14" name="Straight Arrow Connector 13">
+            <a:extLst>
+              <a:ext uri="{FF2B5EF4-FFF2-40B4-BE49-F238E27FC236}">
+                <a16:creationId xmlns:a16="http://schemas.microsoft.com/office/drawing/2014/main" id="{938023AD-2B37-44B5-B895-08923EA07627}"/>
+              </a:ext>
+            </a:extLst>
+          </p:cNvPr>
+          <p:cNvCxnSpPr>
+            <a:cxnSpLocks/>
+          </p:cNvCxnSpPr>
+          <p:nvPr/>
+        </p:nvCxnSpPr>
+        <p:spPr>
+          <a:xfrm flipH="1">
+            <a:off x="9866891" y="3558850"/>
+            <a:ext cx="1331" cy="3221711"/>
+          </a:xfrm>
+          <a:prstGeom prst="straightConnector1">
+            <a:avLst/>
+          </a:prstGeom>
+        </p:spPr>
+        <p:style>
+          <a:lnRef idx="2">
+            <a:schemeClr val="dk1"/>
+          </a:lnRef>
+          <a:fillRef idx="0">
+            <a:schemeClr val="dk1"/>
+          </a:fillRef>
+          <a:effectRef idx="1">
+            <a:schemeClr val="dk1"/>
+          </a:effectRef>
+          <a:fontRef idx="minor">
+            <a:schemeClr val="tx1"/>
+          </a:fontRef>
+        </p:style>
+      </p:cxnSp>
+      <p:cxnSp>
+        <p:nvCxnSpPr>
+          <p:cNvPr id="15" name="Straight Arrow Connector 14">
+            <a:extLst>
+              <a:ext uri="{FF2B5EF4-FFF2-40B4-BE49-F238E27FC236}">
+                <a16:creationId xmlns:a16="http://schemas.microsoft.com/office/drawing/2014/main" id="{E58D0140-56C9-42E6-B2EE-685806EB7765}"/>
+              </a:ext>
+            </a:extLst>
+          </p:cNvPr>
+          <p:cNvCxnSpPr>
+            <a:cxnSpLocks/>
+          </p:cNvCxnSpPr>
+          <p:nvPr/>
+        </p:nvCxnSpPr>
+        <p:spPr>
+          <a:xfrm flipH="1">
+            <a:off x="8141593" y="5180022"/>
+            <a:ext cx="3424664" cy="0"/>
+          </a:xfrm>
+          <a:prstGeom prst="straightConnector1">
+            <a:avLst/>
+          </a:prstGeom>
+        </p:spPr>
+        <p:style>
+          <a:lnRef idx="2">
+            <a:schemeClr val="dk1"/>
+          </a:lnRef>
+          <a:fillRef idx="0">
+            <a:schemeClr val="dk1"/>
+          </a:fillRef>
+          <a:effectRef idx="1">
+            <a:schemeClr val="dk1"/>
+          </a:effectRef>
+          <a:fontRef idx="minor">
+            <a:schemeClr val="tx1"/>
+          </a:fontRef>
+        </p:style>
+      </p:cxnSp>
+      <p:sp>
+        <p:nvSpPr>
+          <p:cNvPr id="17" name="Flowchart: Decision 16">
+            <a:extLst>
+              <a:ext uri="{FF2B5EF4-FFF2-40B4-BE49-F238E27FC236}">
+                <a16:creationId xmlns:a16="http://schemas.microsoft.com/office/drawing/2014/main" id="{D1D937C6-6960-44AF-B040-E59F354A795B}"/>
+              </a:ext>
+            </a:extLst>
+          </p:cNvPr>
+          <p:cNvSpPr/>
+          <p:nvPr/>
+        </p:nvSpPr>
+        <p:spPr>
+          <a:xfrm>
+            <a:off x="8573184" y="4365886"/>
+            <a:ext cx="2620073" cy="1642147"/>
+          </a:xfrm>
+          <a:prstGeom prst="flowChartDecision">
+            <a:avLst/>
+          </a:prstGeom>
+        </p:spPr>
+        <p:style>
+          <a:lnRef idx="2">
+            <a:schemeClr val="dk1"/>
+          </a:lnRef>
+          <a:fillRef idx="1">
+            <a:schemeClr val="lt1"/>
+          </a:fillRef>
+          <a:effectRef idx="0">
+            <a:schemeClr val="dk1"/>
+          </a:effectRef>
+          <a:fontRef idx="minor">
+            <a:schemeClr val="dk1"/>
+          </a:fontRef>
+        </p:style>
+        <p:txBody>
+          <a:bodyPr rtlCol="0" anchor="ctr"/>
+          <a:lstStyle/>
+          <a:p>
+            <a:pPr algn="ctr"/>
+            <a:endParaRPr lang="en-US"/>
+          </a:p>
+        </p:txBody>
+      </p:sp>
+      <p:sp>
+        <p:nvSpPr>
+          <p:cNvPr id="8" name="TextBox 7">
+            <a:extLst>
+              <a:ext uri="{FF2B5EF4-FFF2-40B4-BE49-F238E27FC236}">
+                <a16:creationId xmlns:a16="http://schemas.microsoft.com/office/drawing/2014/main" id="{A1FE880C-F705-4886-9AAC-8FAA2693A52F}"/>
+              </a:ext>
+            </a:extLst>
+          </p:cNvPr>
+          <p:cNvSpPr txBox="1"/>
+          <p:nvPr/>
+        </p:nvSpPr>
+        <p:spPr>
+          <a:xfrm>
+            <a:off x="8828948" y="4809693"/>
+            <a:ext cx="2099836" cy="707886"/>
+          </a:xfrm>
+          <a:prstGeom prst="rect">
+            <a:avLst/>
+          </a:prstGeom>
+          <a:noFill/>
+        </p:spPr>
+        <p:txBody>
+          <a:bodyPr wrap="square" rtlCol="0">
+            <a:spAutoFit/>
+          </a:bodyPr>
+          <a:lstStyle/>
+          <a:p>
+            <a:pPr algn="ctr"/>
+            <a:r>
+              <a:rPr lang="en-US" sz="4000" dirty="0"/>
+              <a:t>REPEAT</a:t>
+            </a:r>
+          </a:p>
+        </p:txBody>
+      </p:sp>
+      <p:cxnSp>
+        <p:nvCxnSpPr>
+          <p:cNvPr id="10" name="Straight Arrow Connector 9">
+            <a:extLst>
+              <a:ext uri="{FF2B5EF4-FFF2-40B4-BE49-F238E27FC236}">
+                <a16:creationId xmlns:a16="http://schemas.microsoft.com/office/drawing/2014/main" id="{AC56CD81-4840-4771-BA5C-A4F543DA9A00}"/>
+              </a:ext>
+            </a:extLst>
+          </p:cNvPr>
+          <p:cNvCxnSpPr>
+            <a:cxnSpLocks/>
+          </p:cNvCxnSpPr>
+          <p:nvPr/>
+        </p:nvCxnSpPr>
+        <p:spPr>
+          <a:xfrm flipH="1">
+            <a:off x="10019291" y="102755"/>
+            <a:ext cx="1331" cy="3221711"/>
+          </a:xfrm>
+          <a:prstGeom prst="straightConnector1">
+            <a:avLst/>
+          </a:prstGeom>
+        </p:spPr>
+        <p:style>
+          <a:lnRef idx="2">
+            <a:schemeClr val="dk1"/>
+          </a:lnRef>
+          <a:fillRef idx="0">
+            <a:schemeClr val="dk1"/>
+          </a:fillRef>
+          <a:effectRef idx="1">
+            <a:schemeClr val="dk1"/>
+          </a:effectRef>
+          <a:fontRef idx="minor">
+            <a:schemeClr val="tx1"/>
+          </a:fontRef>
+        </p:style>
+      </p:cxnSp>
+      <p:cxnSp>
+        <p:nvCxnSpPr>
+          <p:cNvPr id="12" name="Straight Arrow Connector 11">
+            <a:extLst>
+              <a:ext uri="{FF2B5EF4-FFF2-40B4-BE49-F238E27FC236}">
+                <a16:creationId xmlns:a16="http://schemas.microsoft.com/office/drawing/2014/main" id="{D888D8D7-8BF4-4B31-B0E7-F4387A8129FA}"/>
+              </a:ext>
+            </a:extLst>
+          </p:cNvPr>
+          <p:cNvCxnSpPr>
+            <a:cxnSpLocks/>
+          </p:cNvCxnSpPr>
+          <p:nvPr/>
+        </p:nvCxnSpPr>
+        <p:spPr>
+          <a:xfrm flipH="1">
+            <a:off x="8293993" y="1723927"/>
+            <a:ext cx="3424664" cy="0"/>
+          </a:xfrm>
+          <a:prstGeom prst="straightConnector1">
+            <a:avLst/>
+          </a:prstGeom>
+        </p:spPr>
+        <p:style>
+          <a:lnRef idx="2">
+            <a:schemeClr val="dk1"/>
+          </a:lnRef>
+          <a:fillRef idx="0">
+            <a:schemeClr val="dk1"/>
+          </a:fillRef>
+          <a:effectRef idx="1">
+            <a:schemeClr val="dk1"/>
+          </a:effectRef>
+          <a:fontRef idx="minor">
+            <a:schemeClr val="tx1"/>
+          </a:fontRef>
+        </p:style>
+      </p:cxnSp>
+      <p:sp>
+        <p:nvSpPr>
+          <p:cNvPr id="13" name="Flowchart: Decision 12">
+            <a:extLst>
+              <a:ext uri="{FF2B5EF4-FFF2-40B4-BE49-F238E27FC236}">
+                <a16:creationId xmlns:a16="http://schemas.microsoft.com/office/drawing/2014/main" id="{18E19241-8C7C-4318-9D68-6087431F5122}"/>
+              </a:ext>
+            </a:extLst>
+          </p:cNvPr>
+          <p:cNvSpPr/>
+          <p:nvPr/>
+        </p:nvSpPr>
+        <p:spPr>
+          <a:xfrm>
+            <a:off x="8725584" y="909791"/>
+            <a:ext cx="2620073" cy="1642147"/>
+          </a:xfrm>
+          <a:prstGeom prst="flowChartDecision">
+            <a:avLst/>
+          </a:prstGeom>
+        </p:spPr>
+        <p:style>
+          <a:lnRef idx="2">
+            <a:schemeClr val="dk1"/>
+          </a:lnRef>
+          <a:fillRef idx="1">
+            <a:schemeClr val="lt1"/>
+          </a:fillRef>
+          <a:effectRef idx="0">
+            <a:schemeClr val="dk1"/>
+          </a:effectRef>
+          <a:fontRef idx="minor">
+            <a:schemeClr val="dk1"/>
+          </a:fontRef>
+        </p:style>
+        <p:txBody>
+          <a:bodyPr rtlCol="0" anchor="ctr"/>
+          <a:lstStyle/>
+          <a:p>
+            <a:pPr algn="ctr"/>
+            <a:endParaRPr lang="en-US"/>
+          </a:p>
+        </p:txBody>
+      </p:sp>
+      <p:sp>
+        <p:nvSpPr>
+          <p:cNvPr id="19" name="TextBox 18">
+            <a:extLst>
+              <a:ext uri="{FF2B5EF4-FFF2-40B4-BE49-F238E27FC236}">
+                <a16:creationId xmlns:a16="http://schemas.microsoft.com/office/drawing/2014/main" id="{200BE565-B3F8-40EE-9998-7AE99F1434C2}"/>
+              </a:ext>
+            </a:extLst>
+          </p:cNvPr>
+          <p:cNvSpPr txBox="1"/>
+          <p:nvPr/>
+        </p:nvSpPr>
+        <p:spPr>
+          <a:xfrm>
+            <a:off x="8981348" y="1353598"/>
+            <a:ext cx="2099836" cy="707886"/>
+          </a:xfrm>
+          <a:prstGeom prst="rect">
+            <a:avLst/>
+          </a:prstGeom>
+          <a:noFill/>
+        </p:spPr>
+        <p:txBody>
+          <a:bodyPr wrap="square" rtlCol="0">
+            <a:spAutoFit/>
+          </a:bodyPr>
+          <a:lstStyle/>
+          <a:p>
+            <a:pPr algn="ctr"/>
+            <a:r>
+              <a:rPr lang="en-US" sz="4000" dirty="0"/>
+              <a:t>WHILE</a:t>
+            </a:r>
+          </a:p>
+        </p:txBody>
+      </p:sp>
+      <p:sp>
+        <p:nvSpPr>
+          <p:cNvPr id="33" name="TextBox 32">
+            <a:extLst>
+              <a:ext uri="{FF2B5EF4-FFF2-40B4-BE49-F238E27FC236}">
+                <a16:creationId xmlns:a16="http://schemas.microsoft.com/office/drawing/2014/main" id="{87DD249F-2525-48A0-943C-60F35EE8409F}"/>
+              </a:ext>
+            </a:extLst>
+          </p:cNvPr>
+          <p:cNvSpPr txBox="1"/>
+          <p:nvPr/>
+        </p:nvSpPr>
+        <p:spPr>
+          <a:xfrm>
+            <a:off x="5419349" y="4365886"/>
+            <a:ext cx="1828800" cy="707886"/>
+          </a:xfrm>
+          <a:prstGeom prst="rect">
+            <a:avLst/>
+          </a:prstGeom>
+        </p:spPr>
+        <p:style>
+          <a:lnRef idx="2">
+            <a:schemeClr val="dk1"/>
+          </a:lnRef>
+          <a:fillRef idx="1">
+            <a:schemeClr val="lt1"/>
+          </a:fillRef>
+          <a:effectRef idx="0">
+            <a:schemeClr val="dk1"/>
+          </a:effectRef>
+          <a:fontRef idx="minor">
+            <a:schemeClr val="dk1"/>
+          </a:fontRef>
+        </p:style>
+        <p:txBody>
+          <a:bodyPr wrap="square" rtlCol="0">
+            <a:spAutoFit/>
+          </a:bodyPr>
+          <a:lstStyle/>
+          <a:p>
+            <a:r>
+              <a:rPr lang="en-US" sz="4000" dirty="0"/>
+              <a:t>SYSYEM</a:t>
+            </a:r>
+          </a:p>
+        </p:txBody>
+      </p:sp>
+      <p:cxnSp>
+        <p:nvCxnSpPr>
+          <p:cNvPr id="2" name="Straight Arrow Connector 1">
+            <a:extLst>
+              <a:ext uri="{FF2B5EF4-FFF2-40B4-BE49-F238E27FC236}">
+                <a16:creationId xmlns:a16="http://schemas.microsoft.com/office/drawing/2014/main" id="{B02FBAB0-6470-4907-8A1A-29B2A8303212}"/>
+              </a:ext>
+            </a:extLst>
+          </p:cNvPr>
+          <p:cNvCxnSpPr>
+            <a:cxnSpLocks/>
+          </p:cNvCxnSpPr>
+          <p:nvPr/>
+        </p:nvCxnSpPr>
+        <p:spPr>
+          <a:xfrm>
+            <a:off x="473343" y="1744522"/>
+            <a:ext cx="4215888" cy="0"/>
+          </a:xfrm>
+          <a:prstGeom prst="straightConnector1">
+            <a:avLst/>
+          </a:prstGeom>
+          <a:ln>
+            <a:tailEnd type="triangle"/>
+          </a:ln>
+        </p:spPr>
+        <p:style>
+          <a:lnRef idx="3">
+            <a:schemeClr val="dk1"/>
+          </a:lnRef>
+          <a:fillRef idx="0">
+            <a:schemeClr val="dk1"/>
+          </a:fillRef>
+          <a:effectRef idx="2">
+            <a:schemeClr val="dk1"/>
+          </a:effectRef>
+          <a:fontRef idx="minor">
+            <a:schemeClr val="tx1"/>
+          </a:fontRef>
+        </p:style>
+      </p:cxnSp>
+      <p:sp>
+        <p:nvSpPr>
+          <p:cNvPr id="5" name="TextBox 4">
+            <a:extLst>
+              <a:ext uri="{FF2B5EF4-FFF2-40B4-BE49-F238E27FC236}">
+                <a16:creationId xmlns:a16="http://schemas.microsoft.com/office/drawing/2014/main" id="{1F66AD56-E184-47FE-91B6-E59458763E70}"/>
+              </a:ext>
+            </a:extLst>
+          </p:cNvPr>
+          <p:cNvSpPr txBox="1"/>
+          <p:nvPr/>
+        </p:nvSpPr>
+        <p:spPr>
+          <a:xfrm>
+            <a:off x="941510" y="923177"/>
+            <a:ext cx="3314786" cy="707886"/>
+          </a:xfrm>
+          <a:prstGeom prst="rect">
+            <a:avLst/>
+          </a:prstGeom>
+          <a:ln>
+            <a:noFill/>
+          </a:ln>
+        </p:spPr>
+        <p:style>
+          <a:lnRef idx="2">
+            <a:schemeClr val="dk1"/>
+          </a:lnRef>
+          <a:fillRef idx="1">
+            <a:schemeClr val="lt1"/>
+          </a:fillRef>
+          <a:effectRef idx="0">
+            <a:schemeClr val="dk1"/>
+          </a:effectRef>
+          <a:fontRef idx="minor">
+            <a:schemeClr val="dk1"/>
+          </a:fontRef>
+        </p:style>
+        <p:txBody>
+          <a:bodyPr wrap="square" rtlCol="0">
+            <a:spAutoFit/>
+          </a:bodyPr>
+          <a:lstStyle/>
+          <a:p>
+            <a:pPr algn="ctr"/>
+            <a:r>
+              <a:rPr lang="en-US" sz="4000" dirty="0"/>
+              <a:t>MSG(OBJECT)</a:t>
+            </a:r>
+          </a:p>
+        </p:txBody>
+      </p:sp>
+      <p:sp>
+        <p:nvSpPr>
+          <p:cNvPr id="7" name="Isosceles Triangle 6">
+            <a:extLst>
+              <a:ext uri="{FF2B5EF4-FFF2-40B4-BE49-F238E27FC236}">
+                <a16:creationId xmlns:a16="http://schemas.microsoft.com/office/drawing/2014/main" id="{E0436FA0-7B35-4F39-8E1F-D84A2C2008FE}"/>
+              </a:ext>
+            </a:extLst>
+          </p:cNvPr>
+          <p:cNvSpPr/>
+          <p:nvPr/>
+        </p:nvSpPr>
+        <p:spPr>
+          <a:xfrm rot="5400000">
+            <a:off x="4513256" y="1510122"/>
+            <a:ext cx="707886" cy="489593"/>
+          </a:xfrm>
+          <a:prstGeom prst="triangle">
+            <a:avLst/>
+          </a:prstGeom>
+        </p:spPr>
+        <p:style>
+          <a:lnRef idx="2">
+            <a:schemeClr val="dk1">
+              <a:shade val="50000"/>
+            </a:schemeClr>
+          </a:lnRef>
+          <a:fillRef idx="1">
+            <a:schemeClr val="dk1"/>
+          </a:fillRef>
+          <a:effectRef idx="0">
+            <a:schemeClr val="dk1"/>
+          </a:effectRef>
+          <a:fontRef idx="minor">
+            <a:schemeClr val="lt1"/>
+          </a:fontRef>
+        </p:style>
+        <p:txBody>
+          <a:bodyPr rtlCol="0" anchor="ctr"/>
+          <a:lstStyle/>
+          <a:p>
+            <a:pPr algn="ctr"/>
+            <a:endParaRPr lang="en-US"/>
+          </a:p>
+        </p:txBody>
+      </p:sp>
+    </p:spTree>
+    <p:extLst>
+      <p:ext uri="{BB962C8B-B14F-4D97-AF65-F5344CB8AC3E}">
+        <p14:creationId xmlns:p14="http://schemas.microsoft.com/office/powerpoint/2010/main" val="3275622678"/>
+      </p:ext>
+    </p:extLst>
+  </p:cSld>
+  <p:clrMapOvr>
+    <a:masterClrMapping/>
+  </p:clrMapOvr>
+</p:sld>
+</file>
+
+<file path=ppt/slides/slide7.xml><?xml version="1.0" encoding="utf-8"?>
+<p:sld xmlns:a="http://schemas.openxmlformats.org/drawingml/2006/main" xmlns:r="http://schemas.openxmlformats.org/officeDocument/2006/relationships" xmlns:p="http://schemas.openxmlformats.org/presentationml/2006/main">
+  <p:cSld>
+    <p:spTree>
+      <p:nvGrpSpPr>
+        <p:cNvPr id="1" name=""/>
+        <p:cNvGrpSpPr/>
+        <p:nvPr/>
+      </p:nvGrpSpPr>
+      <p:grpSpPr>
+        <a:xfrm>
+          <a:off x="0" y="0"/>
+          <a:ext cx="0" cy="0"/>
+          <a:chOff x="0" y="0"/>
+          <a:chExt cx="0" cy="0"/>
+        </a:xfrm>
+      </p:grpSpPr>
       <p:pic>
         <p:nvPicPr>
           <p:cNvPr id="10" name="Picture 10">

</xml_diff>

<commit_message>
package diagram ad interim + ..
</commit_message>
<xml_diff>
--- a/doc/Presentation.pptx
+++ b/doc/Presentation.pptx
@@ -7,11 +7,17 @@
   <p:sldIdLst>
     <p:sldId id="256" r:id="rId2"/>
     <p:sldId id="258" r:id="rId3"/>
-    <p:sldId id="257" r:id="rId4"/>
-    <p:sldId id="260" r:id="rId5"/>
-    <p:sldId id="259" r:id="rId6"/>
-    <p:sldId id="262" r:id="rId7"/>
-    <p:sldId id="261" r:id="rId8"/>
+    <p:sldId id="266" r:id="rId4"/>
+    <p:sldId id="264" r:id="rId5"/>
+    <p:sldId id="265" r:id="rId6"/>
+    <p:sldId id="267" r:id="rId7"/>
+    <p:sldId id="257" r:id="rId8"/>
+    <p:sldId id="260" r:id="rId9"/>
+    <p:sldId id="263" r:id="rId10"/>
+    <p:sldId id="268" r:id="rId11"/>
+    <p:sldId id="259" r:id="rId12"/>
+    <p:sldId id="262" r:id="rId13"/>
+    <p:sldId id="261" r:id="rId14"/>
   </p:sldIdLst>
   <p:sldSz cx="12192000" cy="6858000"/>
   <p:notesSz cx="6858000" cy="9144000"/>
@@ -260,7 +266,7 @@
           <a:p>
             <a:fld id="{C44077DE-86EB-4760-86BD-09F56F36472D}" type="datetimeFigureOut">
               <a:rPr lang="en-US" smtClean="0"/>
-              <a:t>12/30/2022</a:t>
+              <a:t>1/14/2023</a:t>
             </a:fld>
             <a:endParaRPr lang="en-US"/>
           </a:p>
@@ -458,7 +464,7 @@
           <a:p>
             <a:fld id="{C44077DE-86EB-4760-86BD-09F56F36472D}" type="datetimeFigureOut">
               <a:rPr lang="en-US" smtClean="0"/>
-              <a:t>12/30/2022</a:t>
+              <a:t>1/14/2023</a:t>
             </a:fld>
             <a:endParaRPr lang="en-US"/>
           </a:p>
@@ -666,7 +672,7 @@
           <a:p>
             <a:fld id="{C44077DE-86EB-4760-86BD-09F56F36472D}" type="datetimeFigureOut">
               <a:rPr lang="en-US" smtClean="0"/>
-              <a:t>12/30/2022</a:t>
+              <a:t>1/14/2023</a:t>
             </a:fld>
             <a:endParaRPr lang="en-US"/>
           </a:p>
@@ -864,7 +870,7 @@
           <a:p>
             <a:fld id="{C44077DE-86EB-4760-86BD-09F56F36472D}" type="datetimeFigureOut">
               <a:rPr lang="en-US" smtClean="0"/>
-              <a:t>12/30/2022</a:t>
+              <a:t>1/14/2023</a:t>
             </a:fld>
             <a:endParaRPr lang="en-US"/>
           </a:p>
@@ -1139,7 +1145,7 @@
           <a:p>
             <a:fld id="{C44077DE-86EB-4760-86BD-09F56F36472D}" type="datetimeFigureOut">
               <a:rPr lang="en-US" smtClean="0"/>
-              <a:t>12/30/2022</a:t>
+              <a:t>1/14/2023</a:t>
             </a:fld>
             <a:endParaRPr lang="en-US"/>
           </a:p>
@@ -1404,7 +1410,7 @@
           <a:p>
             <a:fld id="{C44077DE-86EB-4760-86BD-09F56F36472D}" type="datetimeFigureOut">
               <a:rPr lang="en-US" smtClean="0"/>
-              <a:t>12/30/2022</a:t>
+              <a:t>1/14/2023</a:t>
             </a:fld>
             <a:endParaRPr lang="en-US"/>
           </a:p>
@@ -1816,7 +1822,7 @@
           <a:p>
             <a:fld id="{C44077DE-86EB-4760-86BD-09F56F36472D}" type="datetimeFigureOut">
               <a:rPr lang="en-US" smtClean="0"/>
-              <a:t>12/30/2022</a:t>
+              <a:t>1/14/2023</a:t>
             </a:fld>
             <a:endParaRPr lang="en-US"/>
           </a:p>
@@ -1957,7 +1963,7 @@
           <a:p>
             <a:fld id="{C44077DE-86EB-4760-86BD-09F56F36472D}" type="datetimeFigureOut">
               <a:rPr lang="en-US" smtClean="0"/>
-              <a:t>12/30/2022</a:t>
+              <a:t>1/14/2023</a:t>
             </a:fld>
             <a:endParaRPr lang="en-US"/>
           </a:p>
@@ -2070,7 +2076,7 @@
           <a:p>
             <a:fld id="{C44077DE-86EB-4760-86BD-09F56F36472D}" type="datetimeFigureOut">
               <a:rPr lang="en-US" smtClean="0"/>
-              <a:t>12/30/2022</a:t>
+              <a:t>1/14/2023</a:t>
             </a:fld>
             <a:endParaRPr lang="en-US"/>
           </a:p>
@@ -2381,7 +2387,7 @@
           <a:p>
             <a:fld id="{C44077DE-86EB-4760-86BD-09F56F36472D}" type="datetimeFigureOut">
               <a:rPr lang="en-US" smtClean="0"/>
-              <a:t>12/30/2022</a:t>
+              <a:t>1/14/2023</a:t>
             </a:fld>
             <a:endParaRPr lang="en-US"/>
           </a:p>
@@ -2669,7 +2675,7 @@
           <a:p>
             <a:fld id="{C44077DE-86EB-4760-86BD-09F56F36472D}" type="datetimeFigureOut">
               <a:rPr lang="en-US" smtClean="0"/>
-              <a:t>12/30/2022</a:t>
+              <a:t>1/14/2023</a:t>
             </a:fld>
             <a:endParaRPr lang="en-US"/>
           </a:p>
@@ -2910,7 +2916,7 @@
           <a:p>
             <a:fld id="{C44077DE-86EB-4760-86BD-09F56F36472D}" type="datetimeFigureOut">
               <a:rPr lang="en-US" smtClean="0"/>
-              <a:t>12/30/2022</a:t>
+              <a:t>1/14/2023</a:t>
             </a:fld>
             <a:endParaRPr lang="en-US"/>
           </a:p>
@@ -3390,6 +3396,1672 @@
 </p:sld>
 </file>
 
+<file path=ppt/slides/slide10.xml><?xml version="1.0" encoding="utf-8"?>
+<p:sld xmlns:a="http://schemas.openxmlformats.org/drawingml/2006/main" xmlns:r="http://schemas.openxmlformats.org/officeDocument/2006/relationships" xmlns:p="http://schemas.openxmlformats.org/presentationml/2006/main">
+  <p:cSld>
+    <p:spTree>
+      <p:nvGrpSpPr>
+        <p:cNvPr id="1" name=""/>
+        <p:cNvGrpSpPr/>
+        <p:nvPr/>
+      </p:nvGrpSpPr>
+      <p:grpSpPr>
+        <a:xfrm>
+          <a:off x="0" y="0"/>
+          <a:ext cx="0" cy="0"/>
+          <a:chOff x="0" y="0"/>
+          <a:chExt cx="0" cy="0"/>
+        </a:xfrm>
+      </p:grpSpPr>
+      <p:pic>
+        <p:nvPicPr>
+          <p:cNvPr id="4" name="Picture 3">
+            <a:extLst>
+              <a:ext uri="{FF2B5EF4-FFF2-40B4-BE49-F238E27FC236}">
+                <a16:creationId xmlns:a16="http://schemas.microsoft.com/office/drawing/2014/main" id="{36D95086-705A-4B0A-A61C-70E57F59F620}"/>
+              </a:ext>
+            </a:extLst>
+          </p:cNvPr>
+          <p:cNvPicPr>
+            <a:picLocks noChangeAspect="1"/>
+          </p:cNvPicPr>
+          <p:nvPr/>
+        </p:nvPicPr>
+        <p:blipFill>
+          <a:blip r:embed="rId2"/>
+          <a:stretch>
+            <a:fillRect/>
+          </a:stretch>
+        </p:blipFill>
+        <p:spPr>
+          <a:xfrm>
+            <a:off x="2048064" y="133634"/>
+            <a:ext cx="8095871" cy="6724366"/>
+          </a:xfrm>
+          <a:prstGeom prst="rect">
+            <a:avLst/>
+          </a:prstGeom>
+        </p:spPr>
+      </p:pic>
+    </p:spTree>
+    <p:extLst>
+      <p:ext uri="{BB962C8B-B14F-4D97-AF65-F5344CB8AC3E}">
+        <p14:creationId xmlns:p14="http://schemas.microsoft.com/office/powerpoint/2010/main" val="4175845167"/>
+      </p:ext>
+    </p:extLst>
+  </p:cSld>
+  <p:clrMapOvr>
+    <a:masterClrMapping/>
+  </p:clrMapOvr>
+</p:sld>
+</file>
+
+<file path=ppt/slides/slide11.xml><?xml version="1.0" encoding="utf-8"?>
+<p:sld xmlns:a="http://schemas.openxmlformats.org/drawingml/2006/main" xmlns:r="http://schemas.openxmlformats.org/officeDocument/2006/relationships" xmlns:p="http://schemas.openxmlformats.org/presentationml/2006/main">
+  <p:cSld>
+    <p:spTree>
+      <p:nvGrpSpPr>
+        <p:cNvPr id="1" name=""/>
+        <p:cNvGrpSpPr/>
+        <p:nvPr/>
+      </p:nvGrpSpPr>
+      <p:grpSpPr>
+        <a:xfrm>
+          <a:off x="0" y="0"/>
+          <a:ext cx="0" cy="0"/>
+          <a:chOff x="0" y="0"/>
+          <a:chExt cx="0" cy="0"/>
+        </a:xfrm>
+      </p:grpSpPr>
+      <p:cxnSp>
+        <p:nvCxnSpPr>
+          <p:cNvPr id="2" name="Straight Arrow Connector 1">
+            <a:extLst>
+              <a:ext uri="{FF2B5EF4-FFF2-40B4-BE49-F238E27FC236}">
+                <a16:creationId xmlns:a16="http://schemas.microsoft.com/office/drawing/2014/main" id="{FC7C411A-7FF6-4365-B951-2F18B5CC188C}"/>
+              </a:ext>
+            </a:extLst>
+          </p:cNvPr>
+          <p:cNvCxnSpPr>
+            <a:cxnSpLocks/>
+          </p:cNvCxnSpPr>
+          <p:nvPr/>
+        </p:nvCxnSpPr>
+        <p:spPr>
+          <a:xfrm>
+            <a:off x="2534619" y="2211737"/>
+            <a:ext cx="0" cy="1420678"/>
+          </a:xfrm>
+          <a:prstGeom prst="straightConnector1">
+            <a:avLst/>
+          </a:prstGeom>
+        </p:spPr>
+        <p:style>
+          <a:lnRef idx="3">
+            <a:schemeClr val="dk1"/>
+          </a:lnRef>
+          <a:fillRef idx="0">
+            <a:schemeClr val="dk1"/>
+          </a:fillRef>
+          <a:effectRef idx="2">
+            <a:schemeClr val="dk1"/>
+          </a:effectRef>
+          <a:fontRef idx="minor">
+            <a:schemeClr val="tx1"/>
+          </a:fontRef>
+        </p:style>
+      </p:cxnSp>
+      <p:sp>
+        <p:nvSpPr>
+          <p:cNvPr id="16" name="Rectangle 15">
+            <a:extLst>
+              <a:ext uri="{FF2B5EF4-FFF2-40B4-BE49-F238E27FC236}">
+                <a16:creationId xmlns:a16="http://schemas.microsoft.com/office/drawing/2014/main" id="{3D56F7A0-0DD4-4580-A120-CE3EE870B968}"/>
+              </a:ext>
+            </a:extLst>
+          </p:cNvPr>
+          <p:cNvSpPr/>
+          <p:nvPr/>
+        </p:nvSpPr>
+        <p:spPr>
+          <a:xfrm>
+            <a:off x="1620219" y="2922076"/>
+            <a:ext cx="1828800" cy="1828800"/>
+          </a:xfrm>
+          <a:prstGeom prst="rect">
+            <a:avLst/>
+          </a:prstGeom>
+          <a:noFill/>
+          <a:ln>
+            <a:solidFill>
+              <a:schemeClr val="tx1"/>
+            </a:solidFill>
+          </a:ln>
+        </p:spPr>
+        <p:style>
+          <a:lnRef idx="2">
+            <a:schemeClr val="dk1"/>
+          </a:lnRef>
+          <a:fillRef idx="1">
+            <a:schemeClr val="lt1"/>
+          </a:fillRef>
+          <a:effectRef idx="0">
+            <a:schemeClr val="dk1"/>
+          </a:effectRef>
+          <a:fontRef idx="minor">
+            <a:schemeClr val="dk1"/>
+          </a:fontRef>
+        </p:style>
+        <p:txBody>
+          <a:bodyPr rtlCol="0" anchor="ctr"/>
+          <a:lstStyle/>
+          <a:p>
+            <a:pPr algn="ctr"/>
+            <a:endParaRPr lang="en-US"/>
+          </a:p>
+        </p:txBody>
+      </p:sp>
+      <p:sp>
+        <p:nvSpPr>
+          <p:cNvPr id="18" name="Rectangle 17">
+            <a:extLst>
+              <a:ext uri="{FF2B5EF4-FFF2-40B4-BE49-F238E27FC236}">
+                <a16:creationId xmlns:a16="http://schemas.microsoft.com/office/drawing/2014/main" id="{FB1DE2F0-70CD-4526-94D0-953BFECB7A2F}"/>
+              </a:ext>
+            </a:extLst>
+          </p:cNvPr>
+          <p:cNvSpPr/>
+          <p:nvPr/>
+        </p:nvSpPr>
+        <p:spPr>
+          <a:xfrm>
+            <a:off x="1368650" y="3632415"/>
+            <a:ext cx="2331937" cy="1828800"/>
+          </a:xfrm>
+          <a:prstGeom prst="rect">
+            <a:avLst/>
+          </a:prstGeom>
+          <a:solidFill>
+            <a:schemeClr val="bg1"/>
+          </a:solidFill>
+          <a:ln>
+            <a:noFill/>
+          </a:ln>
+        </p:spPr>
+        <p:style>
+          <a:lnRef idx="2">
+            <a:schemeClr val="dk1"/>
+          </a:lnRef>
+          <a:fillRef idx="1">
+            <a:schemeClr val="lt1"/>
+          </a:fillRef>
+          <a:effectRef idx="0">
+            <a:schemeClr val="dk1"/>
+          </a:effectRef>
+          <a:fontRef idx="minor">
+            <a:schemeClr val="dk1"/>
+          </a:fontRef>
+        </p:style>
+        <p:txBody>
+          <a:bodyPr rtlCol="0" anchor="ctr"/>
+          <a:lstStyle/>
+          <a:p>
+            <a:pPr algn="ctr"/>
+            <a:endParaRPr lang="en-US"/>
+          </a:p>
+        </p:txBody>
+      </p:sp>
+      <p:sp>
+        <p:nvSpPr>
+          <p:cNvPr id="20" name="Flowchart: Terminator 19">
+            <a:extLst>
+              <a:ext uri="{FF2B5EF4-FFF2-40B4-BE49-F238E27FC236}">
+                <a16:creationId xmlns:a16="http://schemas.microsoft.com/office/drawing/2014/main" id="{8D24B2F4-D525-40AE-8FE7-EB6BDA12C435}"/>
+              </a:ext>
+            </a:extLst>
+          </p:cNvPr>
+          <p:cNvSpPr/>
+          <p:nvPr/>
+        </p:nvSpPr>
+        <p:spPr>
+          <a:xfrm>
+            <a:off x="3700586" y="1054219"/>
+            <a:ext cx="2395399" cy="1157518"/>
+          </a:xfrm>
+          <a:prstGeom prst="flowChartTerminator">
+            <a:avLst/>
+          </a:prstGeom>
+        </p:spPr>
+        <p:style>
+          <a:lnRef idx="2">
+            <a:schemeClr val="dk1"/>
+          </a:lnRef>
+          <a:fillRef idx="1">
+            <a:schemeClr val="lt1"/>
+          </a:fillRef>
+          <a:effectRef idx="0">
+            <a:schemeClr val="dk1"/>
+          </a:effectRef>
+          <a:fontRef idx="minor">
+            <a:schemeClr val="dk1"/>
+          </a:fontRef>
+        </p:style>
+        <p:txBody>
+          <a:bodyPr rtlCol="0" anchor="ctr"/>
+          <a:lstStyle/>
+          <a:p>
+            <a:pPr algn="ctr"/>
+            <a:endParaRPr lang="en-US"/>
+          </a:p>
+        </p:txBody>
+      </p:sp>
+      <p:sp>
+        <p:nvSpPr>
+          <p:cNvPr id="23" name="Rectangle 22">
+            <a:extLst>
+              <a:ext uri="{FF2B5EF4-FFF2-40B4-BE49-F238E27FC236}">
+                <a16:creationId xmlns:a16="http://schemas.microsoft.com/office/drawing/2014/main" id="{B3E382DF-292B-4AC4-83D7-5175BE806854}"/>
+              </a:ext>
+            </a:extLst>
+          </p:cNvPr>
+          <p:cNvSpPr/>
+          <p:nvPr/>
+        </p:nvSpPr>
+        <p:spPr>
+          <a:xfrm>
+            <a:off x="4792959" y="4417687"/>
+            <a:ext cx="2062038" cy="969264"/>
+          </a:xfrm>
+          <a:prstGeom prst="rect">
+            <a:avLst/>
+          </a:prstGeom>
+        </p:spPr>
+        <p:style>
+          <a:lnRef idx="2">
+            <a:schemeClr val="dk1"/>
+          </a:lnRef>
+          <a:fillRef idx="1">
+            <a:schemeClr val="lt1"/>
+          </a:fillRef>
+          <a:effectRef idx="0">
+            <a:schemeClr val="dk1"/>
+          </a:effectRef>
+          <a:fontRef idx="minor">
+            <a:schemeClr val="dk1"/>
+          </a:fontRef>
+        </p:style>
+        <p:txBody>
+          <a:bodyPr rtlCol="0" anchor="ctr"/>
+          <a:lstStyle/>
+          <a:p>
+            <a:pPr algn="ctr"/>
+            <a:endParaRPr lang="en-US"/>
+          </a:p>
+        </p:txBody>
+      </p:sp>
+      <p:pic>
+        <p:nvPicPr>
+          <p:cNvPr id="9" name="Picture 8">
+            <a:extLst>
+              <a:ext uri="{FF2B5EF4-FFF2-40B4-BE49-F238E27FC236}">
+                <a16:creationId xmlns:a16="http://schemas.microsoft.com/office/drawing/2014/main" id="{BE230AFA-6692-43C5-A838-F1E762CDE0BC}"/>
+              </a:ext>
+            </a:extLst>
+          </p:cNvPr>
+          <p:cNvPicPr>
+            <a:picLocks noChangeAspect="1"/>
+          </p:cNvPicPr>
+          <p:nvPr/>
+        </p:nvPicPr>
+        <p:blipFill rotWithShape="1">
+          <a:blip r:embed="rId2"/>
+          <a:srcRect l="1" t="-1" r="-8177" b="27194"/>
+          <a:stretch/>
+        </p:blipFill>
+        <p:spPr>
+          <a:xfrm>
+            <a:off x="4872418" y="1414092"/>
+            <a:ext cx="1067969" cy="597081"/>
+          </a:xfrm>
+          <a:prstGeom prst="rect">
+            <a:avLst/>
+          </a:prstGeom>
+        </p:spPr>
+      </p:pic>
+      <p:sp>
+        <p:nvSpPr>
+          <p:cNvPr id="29" name="Isosceles Triangle 28">
+            <a:extLst>
+              <a:ext uri="{FF2B5EF4-FFF2-40B4-BE49-F238E27FC236}">
+                <a16:creationId xmlns:a16="http://schemas.microsoft.com/office/drawing/2014/main" id="{127C05EF-9921-4E7A-A67D-86853ADF73B5}"/>
+              </a:ext>
+            </a:extLst>
+          </p:cNvPr>
+          <p:cNvSpPr/>
+          <p:nvPr/>
+        </p:nvSpPr>
+        <p:spPr>
+          <a:xfrm>
+            <a:off x="6283577" y="5098941"/>
+            <a:ext cx="620260" cy="247018"/>
+          </a:xfrm>
+          <a:prstGeom prst="triangle">
+            <a:avLst/>
+          </a:prstGeom>
+        </p:spPr>
+        <p:style>
+          <a:lnRef idx="2">
+            <a:schemeClr val="dk1">
+              <a:shade val="50000"/>
+            </a:schemeClr>
+          </a:lnRef>
+          <a:fillRef idx="1">
+            <a:schemeClr val="dk1"/>
+          </a:fillRef>
+          <a:effectRef idx="0">
+            <a:schemeClr val="dk1"/>
+          </a:effectRef>
+          <a:fontRef idx="minor">
+            <a:schemeClr val="lt1"/>
+          </a:fontRef>
+        </p:style>
+        <p:txBody>
+          <a:bodyPr rtlCol="0" anchor="ctr"/>
+          <a:lstStyle/>
+          <a:p>
+            <a:pPr algn="ctr"/>
+            <a:endParaRPr lang="en-US"/>
+          </a:p>
+        </p:txBody>
+      </p:sp>
+      <p:sp>
+        <p:nvSpPr>
+          <p:cNvPr id="31" name="Isosceles Triangle 30">
+            <a:extLst>
+              <a:ext uri="{FF2B5EF4-FFF2-40B4-BE49-F238E27FC236}">
+                <a16:creationId xmlns:a16="http://schemas.microsoft.com/office/drawing/2014/main" id="{376560B8-763F-4C6F-A4B6-6FD208CD7E00}"/>
+              </a:ext>
+            </a:extLst>
+          </p:cNvPr>
+          <p:cNvSpPr/>
+          <p:nvPr/>
+        </p:nvSpPr>
+        <p:spPr>
+          <a:xfrm rot="10800000">
+            <a:off x="6274536" y="4783163"/>
+            <a:ext cx="620260" cy="247018"/>
+          </a:xfrm>
+          <a:prstGeom prst="triangle">
+            <a:avLst/>
+          </a:prstGeom>
+        </p:spPr>
+        <p:style>
+          <a:lnRef idx="2">
+            <a:schemeClr val="dk1">
+              <a:shade val="50000"/>
+            </a:schemeClr>
+          </a:lnRef>
+          <a:fillRef idx="1">
+            <a:schemeClr val="dk1"/>
+          </a:fillRef>
+          <a:effectRef idx="0">
+            <a:schemeClr val="dk1"/>
+          </a:effectRef>
+          <a:fontRef idx="minor">
+            <a:schemeClr val="lt1"/>
+          </a:fontRef>
+        </p:style>
+        <p:txBody>
+          <a:bodyPr rtlCol="0" anchor="ctr"/>
+          <a:lstStyle/>
+          <a:p>
+            <a:pPr algn="ctr"/>
+            <a:endParaRPr lang="en-US"/>
+          </a:p>
+        </p:txBody>
+      </p:sp>
+      <p:sp>
+        <p:nvSpPr>
+          <p:cNvPr id="32" name="Flowchart: Off-page Connector 31">
+            <a:extLst>
+              <a:ext uri="{FF2B5EF4-FFF2-40B4-BE49-F238E27FC236}">
+                <a16:creationId xmlns:a16="http://schemas.microsoft.com/office/drawing/2014/main" id="{8DF8B7CF-214B-4A74-865C-E7EEC5E5828F}"/>
+              </a:ext>
+            </a:extLst>
+          </p:cNvPr>
+          <p:cNvSpPr/>
+          <p:nvPr/>
+        </p:nvSpPr>
+        <p:spPr>
+          <a:xfrm rot="16200000" flipH="1">
+            <a:off x="1800302" y="3828037"/>
+            <a:ext cx="1265178" cy="2444172"/>
+          </a:xfrm>
+          <a:prstGeom prst="flowChartOffpageConnector">
+            <a:avLst/>
+          </a:prstGeom>
+        </p:spPr>
+        <p:style>
+          <a:lnRef idx="2">
+            <a:schemeClr val="dk1"/>
+          </a:lnRef>
+          <a:fillRef idx="1">
+            <a:schemeClr val="lt1"/>
+          </a:fillRef>
+          <a:effectRef idx="0">
+            <a:schemeClr val="dk1"/>
+          </a:effectRef>
+          <a:fontRef idx="minor">
+            <a:schemeClr val="dk1"/>
+          </a:fontRef>
+        </p:style>
+        <p:txBody>
+          <a:bodyPr rtlCol="0" anchor="ctr"/>
+          <a:lstStyle/>
+          <a:p>
+            <a:pPr algn="ctr"/>
+            <a:endParaRPr lang="en-US"/>
+          </a:p>
+        </p:txBody>
+      </p:sp>
+      <p:sp>
+        <p:nvSpPr>
+          <p:cNvPr id="6" name="Flowchart: Connector 5">
+            <a:extLst>
+              <a:ext uri="{FF2B5EF4-FFF2-40B4-BE49-F238E27FC236}">
+                <a16:creationId xmlns:a16="http://schemas.microsoft.com/office/drawing/2014/main" id="{A79456F7-D5E1-4F40-A681-3E39572BCD17}"/>
+              </a:ext>
+            </a:extLst>
+          </p:cNvPr>
+          <p:cNvSpPr/>
+          <p:nvPr/>
+        </p:nvSpPr>
+        <p:spPr>
+          <a:xfrm>
+            <a:off x="6418097" y="898590"/>
+            <a:ext cx="1225296" cy="1225658"/>
+          </a:xfrm>
+          <a:prstGeom prst="flowChartConnector">
+            <a:avLst/>
+          </a:prstGeom>
+        </p:spPr>
+        <p:style>
+          <a:lnRef idx="2">
+            <a:schemeClr val="dk1"/>
+          </a:lnRef>
+          <a:fillRef idx="1">
+            <a:schemeClr val="lt1"/>
+          </a:fillRef>
+          <a:effectRef idx="0">
+            <a:schemeClr val="dk1"/>
+          </a:effectRef>
+          <a:fontRef idx="minor">
+            <a:schemeClr val="dk1"/>
+          </a:fontRef>
+        </p:style>
+        <p:txBody>
+          <a:bodyPr rtlCol="0" anchor="ctr"/>
+          <a:lstStyle/>
+          <a:p>
+            <a:pPr algn="ctr"/>
+            <a:endParaRPr lang="en-US"/>
+          </a:p>
+        </p:txBody>
+      </p:sp>
+      <p:sp>
+        <p:nvSpPr>
+          <p:cNvPr id="4" name="Flowchart: Connector 3">
+            <a:extLst>
+              <a:ext uri="{FF2B5EF4-FFF2-40B4-BE49-F238E27FC236}">
+                <a16:creationId xmlns:a16="http://schemas.microsoft.com/office/drawing/2014/main" id="{58EC6F50-1ECB-4CEE-B48B-73E1B3DA38DD}"/>
+              </a:ext>
+            </a:extLst>
+          </p:cNvPr>
+          <p:cNvSpPr/>
+          <p:nvPr/>
+        </p:nvSpPr>
+        <p:spPr>
+          <a:xfrm>
+            <a:off x="6589689" y="1054219"/>
+            <a:ext cx="914400" cy="914400"/>
+          </a:xfrm>
+          <a:prstGeom prst="flowChartConnector">
+            <a:avLst/>
+          </a:prstGeom>
+        </p:spPr>
+        <p:style>
+          <a:lnRef idx="2">
+            <a:schemeClr val="dk1">
+              <a:shade val="50000"/>
+            </a:schemeClr>
+          </a:lnRef>
+          <a:fillRef idx="1">
+            <a:schemeClr val="dk1"/>
+          </a:fillRef>
+          <a:effectRef idx="0">
+            <a:schemeClr val="dk1"/>
+          </a:effectRef>
+          <a:fontRef idx="minor">
+            <a:schemeClr val="lt1"/>
+          </a:fontRef>
+        </p:style>
+        <p:txBody>
+          <a:bodyPr rtlCol="0" anchor="ctr"/>
+          <a:lstStyle/>
+          <a:p>
+            <a:pPr algn="ctr"/>
+            <a:endParaRPr lang="en-US"/>
+          </a:p>
+        </p:txBody>
+      </p:sp>
+      <p:sp>
+        <p:nvSpPr>
+          <p:cNvPr id="5" name="Flowchart: Summing Junction 4">
+            <a:extLst>
+              <a:ext uri="{FF2B5EF4-FFF2-40B4-BE49-F238E27FC236}">
+                <a16:creationId xmlns:a16="http://schemas.microsoft.com/office/drawing/2014/main" id="{8A822004-C1FD-4076-814C-0A778E631ED8}"/>
+              </a:ext>
+            </a:extLst>
+          </p:cNvPr>
+          <p:cNvSpPr/>
+          <p:nvPr/>
+        </p:nvSpPr>
+        <p:spPr>
+          <a:xfrm>
+            <a:off x="351287" y="128403"/>
+            <a:ext cx="1225296" cy="1225296"/>
+          </a:xfrm>
+          <a:prstGeom prst="flowChartSummingJunction">
+            <a:avLst/>
+          </a:prstGeom>
+        </p:spPr>
+        <p:style>
+          <a:lnRef idx="2">
+            <a:schemeClr val="dk1"/>
+          </a:lnRef>
+          <a:fillRef idx="1">
+            <a:schemeClr val="lt1"/>
+          </a:fillRef>
+          <a:effectRef idx="0">
+            <a:schemeClr val="dk1"/>
+          </a:effectRef>
+          <a:fontRef idx="minor">
+            <a:schemeClr val="dk1"/>
+          </a:fontRef>
+        </p:style>
+        <p:txBody>
+          <a:bodyPr rtlCol="0" anchor="ctr"/>
+          <a:lstStyle/>
+          <a:p>
+            <a:pPr algn="ctr"/>
+            <a:endParaRPr lang="en-US"/>
+          </a:p>
+        </p:txBody>
+      </p:sp>
+      <p:cxnSp>
+        <p:nvCxnSpPr>
+          <p:cNvPr id="7" name="Straight Arrow Connector 6">
+            <a:extLst>
+              <a:ext uri="{FF2B5EF4-FFF2-40B4-BE49-F238E27FC236}">
+                <a16:creationId xmlns:a16="http://schemas.microsoft.com/office/drawing/2014/main" id="{D48EFB5E-CE10-4ABF-A875-B0384B0035BB}"/>
+              </a:ext>
+            </a:extLst>
+          </p:cNvPr>
+          <p:cNvCxnSpPr>
+            <a:cxnSpLocks/>
+          </p:cNvCxnSpPr>
+          <p:nvPr/>
+        </p:nvCxnSpPr>
+        <p:spPr>
+          <a:xfrm flipH="1">
+            <a:off x="9714491" y="-18874"/>
+            <a:ext cx="1331" cy="3221711"/>
+          </a:xfrm>
+          <a:prstGeom prst="straightConnector1">
+            <a:avLst/>
+          </a:prstGeom>
+        </p:spPr>
+        <p:style>
+          <a:lnRef idx="2">
+            <a:schemeClr val="dk1"/>
+          </a:lnRef>
+          <a:fillRef idx="0">
+            <a:schemeClr val="dk1"/>
+          </a:fillRef>
+          <a:effectRef idx="1">
+            <a:schemeClr val="dk1"/>
+          </a:effectRef>
+          <a:fontRef idx="minor">
+            <a:schemeClr val="tx1"/>
+          </a:fontRef>
+        </p:style>
+      </p:cxnSp>
+      <p:cxnSp>
+        <p:nvCxnSpPr>
+          <p:cNvPr id="11" name="Straight Arrow Connector 10">
+            <a:extLst>
+              <a:ext uri="{FF2B5EF4-FFF2-40B4-BE49-F238E27FC236}">
+                <a16:creationId xmlns:a16="http://schemas.microsoft.com/office/drawing/2014/main" id="{101488DF-FFC1-47FC-A6F1-4114B1FA3A32}"/>
+              </a:ext>
+            </a:extLst>
+          </p:cNvPr>
+          <p:cNvCxnSpPr>
+            <a:cxnSpLocks/>
+          </p:cNvCxnSpPr>
+          <p:nvPr/>
+        </p:nvCxnSpPr>
+        <p:spPr>
+          <a:xfrm flipH="1">
+            <a:off x="7989193" y="1602298"/>
+            <a:ext cx="3424664" cy="0"/>
+          </a:xfrm>
+          <a:prstGeom prst="straightConnector1">
+            <a:avLst/>
+          </a:prstGeom>
+        </p:spPr>
+        <p:style>
+          <a:lnRef idx="2">
+            <a:schemeClr val="dk1"/>
+          </a:lnRef>
+          <a:fillRef idx="0">
+            <a:schemeClr val="dk1"/>
+          </a:fillRef>
+          <a:effectRef idx="1">
+            <a:schemeClr val="dk1"/>
+          </a:effectRef>
+          <a:fontRef idx="minor">
+            <a:schemeClr val="tx1"/>
+          </a:fontRef>
+        </p:style>
+      </p:cxnSp>
+      <p:sp>
+        <p:nvSpPr>
+          <p:cNvPr id="3" name="Flowchart: Decision 2">
+            <a:extLst>
+              <a:ext uri="{FF2B5EF4-FFF2-40B4-BE49-F238E27FC236}">
+                <a16:creationId xmlns:a16="http://schemas.microsoft.com/office/drawing/2014/main" id="{894AF778-3906-4228-90CD-3997E2AD25D8}"/>
+              </a:ext>
+            </a:extLst>
+          </p:cNvPr>
+          <p:cNvSpPr/>
+          <p:nvPr/>
+        </p:nvSpPr>
+        <p:spPr>
+          <a:xfrm>
+            <a:off x="8787125" y="989650"/>
+            <a:ext cx="1828800" cy="1225296"/>
+          </a:xfrm>
+          <a:prstGeom prst="flowChartDecision">
+            <a:avLst/>
+          </a:prstGeom>
+        </p:spPr>
+        <p:style>
+          <a:lnRef idx="2">
+            <a:schemeClr val="dk1"/>
+          </a:lnRef>
+          <a:fillRef idx="1">
+            <a:schemeClr val="lt1"/>
+          </a:fillRef>
+          <a:effectRef idx="0">
+            <a:schemeClr val="dk1"/>
+          </a:effectRef>
+          <a:fontRef idx="minor">
+            <a:schemeClr val="dk1"/>
+          </a:fontRef>
+        </p:style>
+        <p:txBody>
+          <a:bodyPr rtlCol="0" anchor="ctr"/>
+          <a:lstStyle/>
+          <a:p>
+            <a:pPr algn="ctr"/>
+            <a:endParaRPr lang="en-US"/>
+          </a:p>
+        </p:txBody>
+      </p:sp>
+      <p:sp>
+        <p:nvSpPr>
+          <p:cNvPr id="24" name="TextBox 23">
+            <a:extLst>
+              <a:ext uri="{FF2B5EF4-FFF2-40B4-BE49-F238E27FC236}">
+                <a16:creationId xmlns:a16="http://schemas.microsoft.com/office/drawing/2014/main" id="{07D48274-F408-4E58-8C7B-2C738F5CFFCF}"/>
+              </a:ext>
+            </a:extLst>
+          </p:cNvPr>
+          <p:cNvSpPr txBox="1"/>
+          <p:nvPr/>
+        </p:nvSpPr>
+        <p:spPr>
+          <a:xfrm>
+            <a:off x="9472049" y="1213651"/>
+            <a:ext cx="779435" cy="707886"/>
+          </a:xfrm>
+          <a:prstGeom prst="rect">
+            <a:avLst/>
+          </a:prstGeom>
+          <a:noFill/>
+        </p:spPr>
+        <p:txBody>
+          <a:bodyPr wrap="square" rtlCol="0">
+            <a:spAutoFit/>
+          </a:bodyPr>
+          <a:lstStyle/>
+          <a:p>
+            <a:pPr algn="l"/>
+            <a:r>
+              <a:rPr lang="en-US" sz="4000" dirty="0"/>
+              <a:t>IF</a:t>
+            </a:r>
+          </a:p>
+        </p:txBody>
+      </p:sp>
+      <p:cxnSp>
+        <p:nvCxnSpPr>
+          <p:cNvPr id="14" name="Straight Arrow Connector 13">
+            <a:extLst>
+              <a:ext uri="{FF2B5EF4-FFF2-40B4-BE49-F238E27FC236}">
+                <a16:creationId xmlns:a16="http://schemas.microsoft.com/office/drawing/2014/main" id="{938023AD-2B37-44B5-B895-08923EA07627}"/>
+              </a:ext>
+            </a:extLst>
+          </p:cNvPr>
+          <p:cNvCxnSpPr>
+            <a:cxnSpLocks/>
+          </p:cNvCxnSpPr>
+          <p:nvPr/>
+        </p:nvCxnSpPr>
+        <p:spPr>
+          <a:xfrm flipH="1">
+            <a:off x="9866891" y="3558850"/>
+            <a:ext cx="1331" cy="3221711"/>
+          </a:xfrm>
+          <a:prstGeom prst="straightConnector1">
+            <a:avLst/>
+          </a:prstGeom>
+        </p:spPr>
+        <p:style>
+          <a:lnRef idx="2">
+            <a:schemeClr val="dk1"/>
+          </a:lnRef>
+          <a:fillRef idx="0">
+            <a:schemeClr val="dk1"/>
+          </a:fillRef>
+          <a:effectRef idx="1">
+            <a:schemeClr val="dk1"/>
+          </a:effectRef>
+          <a:fontRef idx="minor">
+            <a:schemeClr val="tx1"/>
+          </a:fontRef>
+        </p:style>
+      </p:cxnSp>
+      <p:cxnSp>
+        <p:nvCxnSpPr>
+          <p:cNvPr id="15" name="Straight Arrow Connector 14">
+            <a:extLst>
+              <a:ext uri="{FF2B5EF4-FFF2-40B4-BE49-F238E27FC236}">
+                <a16:creationId xmlns:a16="http://schemas.microsoft.com/office/drawing/2014/main" id="{E58D0140-56C9-42E6-B2EE-685806EB7765}"/>
+              </a:ext>
+            </a:extLst>
+          </p:cNvPr>
+          <p:cNvCxnSpPr>
+            <a:cxnSpLocks/>
+          </p:cNvCxnSpPr>
+          <p:nvPr/>
+        </p:nvCxnSpPr>
+        <p:spPr>
+          <a:xfrm flipH="1">
+            <a:off x="8141593" y="5180022"/>
+            <a:ext cx="3424664" cy="0"/>
+          </a:xfrm>
+          <a:prstGeom prst="straightConnector1">
+            <a:avLst/>
+          </a:prstGeom>
+        </p:spPr>
+        <p:style>
+          <a:lnRef idx="2">
+            <a:schemeClr val="dk1"/>
+          </a:lnRef>
+          <a:fillRef idx="0">
+            <a:schemeClr val="dk1"/>
+          </a:fillRef>
+          <a:effectRef idx="1">
+            <a:schemeClr val="dk1"/>
+          </a:effectRef>
+          <a:fontRef idx="minor">
+            <a:schemeClr val="tx1"/>
+          </a:fontRef>
+        </p:style>
+      </p:cxnSp>
+      <p:sp>
+        <p:nvSpPr>
+          <p:cNvPr id="17" name="Flowchart: Decision 16">
+            <a:extLst>
+              <a:ext uri="{FF2B5EF4-FFF2-40B4-BE49-F238E27FC236}">
+                <a16:creationId xmlns:a16="http://schemas.microsoft.com/office/drawing/2014/main" id="{D1D937C6-6960-44AF-B040-E59F354A795B}"/>
+              </a:ext>
+            </a:extLst>
+          </p:cNvPr>
+          <p:cNvSpPr/>
+          <p:nvPr/>
+        </p:nvSpPr>
+        <p:spPr>
+          <a:xfrm>
+            <a:off x="8939525" y="4567374"/>
+            <a:ext cx="1828800" cy="1225296"/>
+          </a:xfrm>
+          <a:prstGeom prst="flowChartDecision">
+            <a:avLst/>
+          </a:prstGeom>
+        </p:spPr>
+        <p:style>
+          <a:lnRef idx="2">
+            <a:schemeClr val="dk1"/>
+          </a:lnRef>
+          <a:fillRef idx="1">
+            <a:schemeClr val="lt1"/>
+          </a:fillRef>
+          <a:effectRef idx="0">
+            <a:schemeClr val="dk1"/>
+          </a:effectRef>
+          <a:fontRef idx="minor">
+            <a:schemeClr val="dk1"/>
+          </a:fontRef>
+        </p:style>
+        <p:txBody>
+          <a:bodyPr rtlCol="0" anchor="ctr"/>
+          <a:lstStyle/>
+          <a:p>
+            <a:pPr algn="ctr"/>
+            <a:endParaRPr lang="en-US"/>
+          </a:p>
+        </p:txBody>
+      </p:sp>
+      <p:sp>
+        <p:nvSpPr>
+          <p:cNvPr id="27" name="TextBox 26">
+            <a:extLst>
+              <a:ext uri="{FF2B5EF4-FFF2-40B4-BE49-F238E27FC236}">
+                <a16:creationId xmlns:a16="http://schemas.microsoft.com/office/drawing/2014/main" id="{63F8C744-654F-43D5-AA9B-7611CF512144}"/>
+              </a:ext>
+            </a:extLst>
+          </p:cNvPr>
+          <p:cNvSpPr txBox="1"/>
+          <p:nvPr/>
+        </p:nvSpPr>
+        <p:spPr>
+          <a:xfrm>
+            <a:off x="9213605" y="4882960"/>
+            <a:ext cx="1263547" cy="538609"/>
+          </a:xfrm>
+          <a:prstGeom prst="rect">
+            <a:avLst/>
+          </a:prstGeom>
+          <a:noFill/>
+        </p:spPr>
+        <p:txBody>
+          <a:bodyPr wrap="square" rtlCol="0">
+            <a:spAutoFit/>
+          </a:bodyPr>
+          <a:lstStyle/>
+          <a:p>
+            <a:pPr algn="ctr"/>
+            <a:r>
+              <a:rPr lang="en-US" sz="2900" dirty="0"/>
+              <a:t>Repeat</a:t>
+            </a:r>
+          </a:p>
+        </p:txBody>
+      </p:sp>
+    </p:spTree>
+    <p:extLst>
+      <p:ext uri="{BB962C8B-B14F-4D97-AF65-F5344CB8AC3E}">
+        <p14:creationId xmlns:p14="http://schemas.microsoft.com/office/powerpoint/2010/main" val="31210940"/>
+      </p:ext>
+    </p:extLst>
+  </p:cSld>
+  <p:clrMapOvr>
+    <a:masterClrMapping/>
+  </p:clrMapOvr>
+</p:sld>
+</file>
+
+<file path=ppt/slides/slide12.xml><?xml version="1.0" encoding="utf-8"?>
+<p:sld xmlns:a="http://schemas.openxmlformats.org/drawingml/2006/main" xmlns:r="http://schemas.openxmlformats.org/officeDocument/2006/relationships" xmlns:p="http://schemas.openxmlformats.org/presentationml/2006/main">
+  <p:cSld>
+    <p:spTree>
+      <p:nvGrpSpPr>
+        <p:cNvPr id="1" name=""/>
+        <p:cNvGrpSpPr/>
+        <p:nvPr/>
+      </p:nvGrpSpPr>
+      <p:grpSpPr>
+        <a:xfrm>
+          <a:off x="0" y="0"/>
+          <a:ext cx="0" cy="0"/>
+          <a:chOff x="0" y="0"/>
+          <a:chExt cx="0" cy="0"/>
+        </a:xfrm>
+      </p:grpSpPr>
+      <p:cxnSp>
+        <p:nvCxnSpPr>
+          <p:cNvPr id="14" name="Straight Arrow Connector 13">
+            <a:extLst>
+              <a:ext uri="{FF2B5EF4-FFF2-40B4-BE49-F238E27FC236}">
+                <a16:creationId xmlns:a16="http://schemas.microsoft.com/office/drawing/2014/main" id="{938023AD-2B37-44B5-B895-08923EA07627}"/>
+              </a:ext>
+            </a:extLst>
+          </p:cNvPr>
+          <p:cNvCxnSpPr>
+            <a:cxnSpLocks/>
+          </p:cNvCxnSpPr>
+          <p:nvPr/>
+        </p:nvCxnSpPr>
+        <p:spPr>
+          <a:xfrm flipH="1">
+            <a:off x="9866891" y="3558850"/>
+            <a:ext cx="1331" cy="3221711"/>
+          </a:xfrm>
+          <a:prstGeom prst="straightConnector1">
+            <a:avLst/>
+          </a:prstGeom>
+        </p:spPr>
+        <p:style>
+          <a:lnRef idx="2">
+            <a:schemeClr val="dk1"/>
+          </a:lnRef>
+          <a:fillRef idx="0">
+            <a:schemeClr val="dk1"/>
+          </a:fillRef>
+          <a:effectRef idx="1">
+            <a:schemeClr val="dk1"/>
+          </a:effectRef>
+          <a:fontRef idx="minor">
+            <a:schemeClr val="tx1"/>
+          </a:fontRef>
+        </p:style>
+      </p:cxnSp>
+      <p:cxnSp>
+        <p:nvCxnSpPr>
+          <p:cNvPr id="15" name="Straight Arrow Connector 14">
+            <a:extLst>
+              <a:ext uri="{FF2B5EF4-FFF2-40B4-BE49-F238E27FC236}">
+                <a16:creationId xmlns:a16="http://schemas.microsoft.com/office/drawing/2014/main" id="{E58D0140-56C9-42E6-B2EE-685806EB7765}"/>
+              </a:ext>
+            </a:extLst>
+          </p:cNvPr>
+          <p:cNvCxnSpPr>
+            <a:cxnSpLocks/>
+          </p:cNvCxnSpPr>
+          <p:nvPr/>
+        </p:nvCxnSpPr>
+        <p:spPr>
+          <a:xfrm flipH="1">
+            <a:off x="8141593" y="5180022"/>
+            <a:ext cx="3424664" cy="0"/>
+          </a:xfrm>
+          <a:prstGeom prst="straightConnector1">
+            <a:avLst/>
+          </a:prstGeom>
+        </p:spPr>
+        <p:style>
+          <a:lnRef idx="2">
+            <a:schemeClr val="dk1"/>
+          </a:lnRef>
+          <a:fillRef idx="0">
+            <a:schemeClr val="dk1"/>
+          </a:fillRef>
+          <a:effectRef idx="1">
+            <a:schemeClr val="dk1"/>
+          </a:effectRef>
+          <a:fontRef idx="minor">
+            <a:schemeClr val="tx1"/>
+          </a:fontRef>
+        </p:style>
+      </p:cxnSp>
+      <p:sp>
+        <p:nvSpPr>
+          <p:cNvPr id="17" name="Flowchart: Decision 16">
+            <a:extLst>
+              <a:ext uri="{FF2B5EF4-FFF2-40B4-BE49-F238E27FC236}">
+                <a16:creationId xmlns:a16="http://schemas.microsoft.com/office/drawing/2014/main" id="{D1D937C6-6960-44AF-B040-E59F354A795B}"/>
+              </a:ext>
+            </a:extLst>
+          </p:cNvPr>
+          <p:cNvSpPr/>
+          <p:nvPr/>
+        </p:nvSpPr>
+        <p:spPr>
+          <a:xfrm>
+            <a:off x="8573184" y="4365886"/>
+            <a:ext cx="2620073" cy="1642147"/>
+          </a:xfrm>
+          <a:prstGeom prst="flowChartDecision">
+            <a:avLst/>
+          </a:prstGeom>
+        </p:spPr>
+        <p:style>
+          <a:lnRef idx="2">
+            <a:schemeClr val="dk1"/>
+          </a:lnRef>
+          <a:fillRef idx="1">
+            <a:schemeClr val="lt1"/>
+          </a:fillRef>
+          <a:effectRef idx="0">
+            <a:schemeClr val="dk1"/>
+          </a:effectRef>
+          <a:fontRef idx="minor">
+            <a:schemeClr val="dk1"/>
+          </a:fontRef>
+        </p:style>
+        <p:txBody>
+          <a:bodyPr rtlCol="0" anchor="ctr"/>
+          <a:lstStyle/>
+          <a:p>
+            <a:pPr algn="ctr"/>
+            <a:endParaRPr lang="en-US"/>
+          </a:p>
+        </p:txBody>
+      </p:sp>
+      <p:sp>
+        <p:nvSpPr>
+          <p:cNvPr id="8" name="TextBox 7">
+            <a:extLst>
+              <a:ext uri="{FF2B5EF4-FFF2-40B4-BE49-F238E27FC236}">
+                <a16:creationId xmlns:a16="http://schemas.microsoft.com/office/drawing/2014/main" id="{A1FE880C-F705-4886-9AAC-8FAA2693A52F}"/>
+              </a:ext>
+            </a:extLst>
+          </p:cNvPr>
+          <p:cNvSpPr txBox="1"/>
+          <p:nvPr/>
+        </p:nvSpPr>
+        <p:spPr>
+          <a:xfrm>
+            <a:off x="8828948" y="4809693"/>
+            <a:ext cx="2099836" cy="707886"/>
+          </a:xfrm>
+          <a:prstGeom prst="rect">
+            <a:avLst/>
+          </a:prstGeom>
+          <a:noFill/>
+        </p:spPr>
+        <p:txBody>
+          <a:bodyPr wrap="square" rtlCol="0">
+            <a:spAutoFit/>
+          </a:bodyPr>
+          <a:lstStyle/>
+          <a:p>
+            <a:pPr algn="ctr"/>
+            <a:r>
+              <a:rPr lang="en-US" sz="4000" dirty="0"/>
+              <a:t>REPEAT</a:t>
+            </a:r>
+          </a:p>
+        </p:txBody>
+      </p:sp>
+      <p:cxnSp>
+        <p:nvCxnSpPr>
+          <p:cNvPr id="10" name="Straight Arrow Connector 9">
+            <a:extLst>
+              <a:ext uri="{FF2B5EF4-FFF2-40B4-BE49-F238E27FC236}">
+                <a16:creationId xmlns:a16="http://schemas.microsoft.com/office/drawing/2014/main" id="{AC56CD81-4840-4771-BA5C-A4F543DA9A00}"/>
+              </a:ext>
+            </a:extLst>
+          </p:cNvPr>
+          <p:cNvCxnSpPr>
+            <a:cxnSpLocks/>
+          </p:cNvCxnSpPr>
+          <p:nvPr/>
+        </p:nvCxnSpPr>
+        <p:spPr>
+          <a:xfrm flipH="1">
+            <a:off x="10019291" y="102755"/>
+            <a:ext cx="1331" cy="3221711"/>
+          </a:xfrm>
+          <a:prstGeom prst="straightConnector1">
+            <a:avLst/>
+          </a:prstGeom>
+        </p:spPr>
+        <p:style>
+          <a:lnRef idx="2">
+            <a:schemeClr val="dk1"/>
+          </a:lnRef>
+          <a:fillRef idx="0">
+            <a:schemeClr val="dk1"/>
+          </a:fillRef>
+          <a:effectRef idx="1">
+            <a:schemeClr val="dk1"/>
+          </a:effectRef>
+          <a:fontRef idx="minor">
+            <a:schemeClr val="tx1"/>
+          </a:fontRef>
+        </p:style>
+      </p:cxnSp>
+      <p:cxnSp>
+        <p:nvCxnSpPr>
+          <p:cNvPr id="12" name="Straight Arrow Connector 11">
+            <a:extLst>
+              <a:ext uri="{FF2B5EF4-FFF2-40B4-BE49-F238E27FC236}">
+                <a16:creationId xmlns:a16="http://schemas.microsoft.com/office/drawing/2014/main" id="{D888D8D7-8BF4-4B31-B0E7-F4387A8129FA}"/>
+              </a:ext>
+            </a:extLst>
+          </p:cNvPr>
+          <p:cNvCxnSpPr>
+            <a:cxnSpLocks/>
+          </p:cNvCxnSpPr>
+          <p:nvPr/>
+        </p:nvCxnSpPr>
+        <p:spPr>
+          <a:xfrm flipH="1">
+            <a:off x="8293993" y="1723927"/>
+            <a:ext cx="3424664" cy="0"/>
+          </a:xfrm>
+          <a:prstGeom prst="straightConnector1">
+            <a:avLst/>
+          </a:prstGeom>
+        </p:spPr>
+        <p:style>
+          <a:lnRef idx="2">
+            <a:schemeClr val="dk1"/>
+          </a:lnRef>
+          <a:fillRef idx="0">
+            <a:schemeClr val="dk1"/>
+          </a:fillRef>
+          <a:effectRef idx="1">
+            <a:schemeClr val="dk1"/>
+          </a:effectRef>
+          <a:fontRef idx="minor">
+            <a:schemeClr val="tx1"/>
+          </a:fontRef>
+        </p:style>
+      </p:cxnSp>
+      <p:sp>
+        <p:nvSpPr>
+          <p:cNvPr id="13" name="Flowchart: Decision 12">
+            <a:extLst>
+              <a:ext uri="{FF2B5EF4-FFF2-40B4-BE49-F238E27FC236}">
+                <a16:creationId xmlns:a16="http://schemas.microsoft.com/office/drawing/2014/main" id="{18E19241-8C7C-4318-9D68-6087431F5122}"/>
+              </a:ext>
+            </a:extLst>
+          </p:cNvPr>
+          <p:cNvSpPr/>
+          <p:nvPr/>
+        </p:nvSpPr>
+        <p:spPr>
+          <a:xfrm>
+            <a:off x="8725584" y="909791"/>
+            <a:ext cx="2620073" cy="1642147"/>
+          </a:xfrm>
+          <a:prstGeom prst="flowChartDecision">
+            <a:avLst/>
+          </a:prstGeom>
+        </p:spPr>
+        <p:style>
+          <a:lnRef idx="2">
+            <a:schemeClr val="dk1"/>
+          </a:lnRef>
+          <a:fillRef idx="1">
+            <a:schemeClr val="lt1"/>
+          </a:fillRef>
+          <a:effectRef idx="0">
+            <a:schemeClr val="dk1"/>
+          </a:effectRef>
+          <a:fontRef idx="minor">
+            <a:schemeClr val="dk1"/>
+          </a:fontRef>
+        </p:style>
+        <p:txBody>
+          <a:bodyPr rtlCol="0" anchor="ctr"/>
+          <a:lstStyle/>
+          <a:p>
+            <a:pPr algn="ctr"/>
+            <a:endParaRPr lang="en-US"/>
+          </a:p>
+        </p:txBody>
+      </p:sp>
+      <p:sp>
+        <p:nvSpPr>
+          <p:cNvPr id="19" name="TextBox 18">
+            <a:extLst>
+              <a:ext uri="{FF2B5EF4-FFF2-40B4-BE49-F238E27FC236}">
+                <a16:creationId xmlns:a16="http://schemas.microsoft.com/office/drawing/2014/main" id="{200BE565-B3F8-40EE-9998-7AE99F1434C2}"/>
+              </a:ext>
+            </a:extLst>
+          </p:cNvPr>
+          <p:cNvSpPr txBox="1"/>
+          <p:nvPr/>
+        </p:nvSpPr>
+        <p:spPr>
+          <a:xfrm>
+            <a:off x="8981348" y="1353598"/>
+            <a:ext cx="2099836" cy="707886"/>
+          </a:xfrm>
+          <a:prstGeom prst="rect">
+            <a:avLst/>
+          </a:prstGeom>
+          <a:noFill/>
+        </p:spPr>
+        <p:txBody>
+          <a:bodyPr wrap="square" rtlCol="0">
+            <a:spAutoFit/>
+          </a:bodyPr>
+          <a:lstStyle/>
+          <a:p>
+            <a:pPr algn="ctr"/>
+            <a:r>
+              <a:rPr lang="en-US" sz="4000" dirty="0"/>
+              <a:t>WHILE</a:t>
+            </a:r>
+          </a:p>
+        </p:txBody>
+      </p:sp>
+      <p:sp>
+        <p:nvSpPr>
+          <p:cNvPr id="33" name="TextBox 32">
+            <a:extLst>
+              <a:ext uri="{FF2B5EF4-FFF2-40B4-BE49-F238E27FC236}">
+                <a16:creationId xmlns:a16="http://schemas.microsoft.com/office/drawing/2014/main" id="{87DD249F-2525-48A0-943C-60F35EE8409F}"/>
+              </a:ext>
+            </a:extLst>
+          </p:cNvPr>
+          <p:cNvSpPr txBox="1"/>
+          <p:nvPr/>
+        </p:nvSpPr>
+        <p:spPr>
+          <a:xfrm>
+            <a:off x="5419349" y="4365886"/>
+            <a:ext cx="1828800" cy="707886"/>
+          </a:xfrm>
+          <a:prstGeom prst="rect">
+            <a:avLst/>
+          </a:prstGeom>
+        </p:spPr>
+        <p:style>
+          <a:lnRef idx="2">
+            <a:schemeClr val="dk1"/>
+          </a:lnRef>
+          <a:fillRef idx="1">
+            <a:schemeClr val="lt1"/>
+          </a:fillRef>
+          <a:effectRef idx="0">
+            <a:schemeClr val="dk1"/>
+          </a:effectRef>
+          <a:fontRef idx="minor">
+            <a:schemeClr val="dk1"/>
+          </a:fontRef>
+        </p:style>
+        <p:txBody>
+          <a:bodyPr wrap="square" rtlCol="0">
+            <a:spAutoFit/>
+          </a:bodyPr>
+          <a:lstStyle/>
+          <a:p>
+            <a:r>
+              <a:rPr lang="en-US" sz="4000" dirty="0"/>
+              <a:t>SYSYEM</a:t>
+            </a:r>
+          </a:p>
+        </p:txBody>
+      </p:sp>
+      <p:cxnSp>
+        <p:nvCxnSpPr>
+          <p:cNvPr id="2" name="Straight Arrow Connector 1">
+            <a:extLst>
+              <a:ext uri="{FF2B5EF4-FFF2-40B4-BE49-F238E27FC236}">
+                <a16:creationId xmlns:a16="http://schemas.microsoft.com/office/drawing/2014/main" id="{B02FBAB0-6470-4907-8A1A-29B2A8303212}"/>
+              </a:ext>
+            </a:extLst>
+          </p:cNvPr>
+          <p:cNvCxnSpPr>
+            <a:cxnSpLocks/>
+          </p:cNvCxnSpPr>
+          <p:nvPr/>
+        </p:nvCxnSpPr>
+        <p:spPr>
+          <a:xfrm>
+            <a:off x="473343" y="1744522"/>
+            <a:ext cx="4215888" cy="0"/>
+          </a:xfrm>
+          <a:prstGeom prst="straightConnector1">
+            <a:avLst/>
+          </a:prstGeom>
+          <a:ln>
+            <a:tailEnd type="triangle"/>
+          </a:ln>
+        </p:spPr>
+        <p:style>
+          <a:lnRef idx="3">
+            <a:schemeClr val="dk1"/>
+          </a:lnRef>
+          <a:fillRef idx="0">
+            <a:schemeClr val="dk1"/>
+          </a:fillRef>
+          <a:effectRef idx="2">
+            <a:schemeClr val="dk1"/>
+          </a:effectRef>
+          <a:fontRef idx="minor">
+            <a:schemeClr val="tx1"/>
+          </a:fontRef>
+        </p:style>
+      </p:cxnSp>
+      <p:sp>
+        <p:nvSpPr>
+          <p:cNvPr id="5" name="TextBox 4">
+            <a:extLst>
+              <a:ext uri="{FF2B5EF4-FFF2-40B4-BE49-F238E27FC236}">
+                <a16:creationId xmlns:a16="http://schemas.microsoft.com/office/drawing/2014/main" id="{1F66AD56-E184-47FE-91B6-E59458763E70}"/>
+              </a:ext>
+            </a:extLst>
+          </p:cNvPr>
+          <p:cNvSpPr txBox="1"/>
+          <p:nvPr/>
+        </p:nvSpPr>
+        <p:spPr>
+          <a:xfrm>
+            <a:off x="941510" y="923177"/>
+            <a:ext cx="3314786" cy="707886"/>
+          </a:xfrm>
+          <a:prstGeom prst="rect">
+            <a:avLst/>
+          </a:prstGeom>
+          <a:ln>
+            <a:noFill/>
+          </a:ln>
+        </p:spPr>
+        <p:style>
+          <a:lnRef idx="2">
+            <a:schemeClr val="dk1"/>
+          </a:lnRef>
+          <a:fillRef idx="1">
+            <a:schemeClr val="lt1"/>
+          </a:fillRef>
+          <a:effectRef idx="0">
+            <a:schemeClr val="dk1"/>
+          </a:effectRef>
+          <a:fontRef idx="minor">
+            <a:schemeClr val="dk1"/>
+          </a:fontRef>
+        </p:style>
+        <p:txBody>
+          <a:bodyPr wrap="square" rtlCol="0">
+            <a:spAutoFit/>
+          </a:bodyPr>
+          <a:lstStyle/>
+          <a:p>
+            <a:pPr algn="ctr"/>
+            <a:r>
+              <a:rPr lang="en-US" sz="4000" dirty="0"/>
+              <a:t>MSG(OBJECT)</a:t>
+            </a:r>
+          </a:p>
+        </p:txBody>
+      </p:sp>
+      <p:sp>
+        <p:nvSpPr>
+          <p:cNvPr id="7" name="Isosceles Triangle 6">
+            <a:extLst>
+              <a:ext uri="{FF2B5EF4-FFF2-40B4-BE49-F238E27FC236}">
+                <a16:creationId xmlns:a16="http://schemas.microsoft.com/office/drawing/2014/main" id="{E0436FA0-7B35-4F39-8E1F-D84A2C2008FE}"/>
+              </a:ext>
+            </a:extLst>
+          </p:cNvPr>
+          <p:cNvSpPr/>
+          <p:nvPr/>
+        </p:nvSpPr>
+        <p:spPr>
+          <a:xfrm rot="5400000">
+            <a:off x="4513256" y="1510122"/>
+            <a:ext cx="707886" cy="489593"/>
+          </a:xfrm>
+          <a:prstGeom prst="triangle">
+            <a:avLst/>
+          </a:prstGeom>
+        </p:spPr>
+        <p:style>
+          <a:lnRef idx="2">
+            <a:schemeClr val="dk1">
+              <a:shade val="50000"/>
+            </a:schemeClr>
+          </a:lnRef>
+          <a:fillRef idx="1">
+            <a:schemeClr val="dk1"/>
+          </a:fillRef>
+          <a:effectRef idx="0">
+            <a:schemeClr val="dk1"/>
+          </a:effectRef>
+          <a:fontRef idx="minor">
+            <a:schemeClr val="lt1"/>
+          </a:fontRef>
+        </p:style>
+        <p:txBody>
+          <a:bodyPr rtlCol="0" anchor="ctr"/>
+          <a:lstStyle/>
+          <a:p>
+            <a:pPr algn="ctr"/>
+            <a:endParaRPr lang="en-US"/>
+          </a:p>
+        </p:txBody>
+      </p:sp>
+    </p:spTree>
+    <p:extLst>
+      <p:ext uri="{BB962C8B-B14F-4D97-AF65-F5344CB8AC3E}">
+        <p14:creationId xmlns:p14="http://schemas.microsoft.com/office/powerpoint/2010/main" val="3275622678"/>
+      </p:ext>
+    </p:extLst>
+  </p:cSld>
+  <p:clrMapOvr>
+    <a:masterClrMapping/>
+  </p:clrMapOvr>
+</p:sld>
+</file>
+
+<file path=ppt/slides/slide13.xml><?xml version="1.0" encoding="utf-8"?>
+<p:sld xmlns:a="http://schemas.openxmlformats.org/drawingml/2006/main" xmlns:r="http://schemas.openxmlformats.org/officeDocument/2006/relationships" xmlns:p="http://schemas.openxmlformats.org/presentationml/2006/main">
+  <p:cSld>
+    <p:spTree>
+      <p:nvGrpSpPr>
+        <p:cNvPr id="1" name=""/>
+        <p:cNvGrpSpPr/>
+        <p:nvPr/>
+      </p:nvGrpSpPr>
+      <p:grpSpPr>
+        <a:xfrm>
+          <a:off x="0" y="0"/>
+          <a:ext cx="0" cy="0"/>
+          <a:chOff x="0" y="0"/>
+          <a:chExt cx="0" cy="0"/>
+        </a:xfrm>
+      </p:grpSpPr>
+      <p:pic>
+        <p:nvPicPr>
+          <p:cNvPr id="10" name="Picture 10">
+            <a:extLst>
+              <a:ext uri="{FF2B5EF4-FFF2-40B4-BE49-F238E27FC236}">
+                <a16:creationId xmlns:a16="http://schemas.microsoft.com/office/drawing/2014/main" id="{CFD107E3-4C74-4B10-931E-72CD9D8CE921}"/>
+              </a:ext>
+            </a:extLst>
+          </p:cNvPr>
+          <p:cNvPicPr>
+            <a:picLocks noChangeAspect="1"/>
+          </p:cNvPicPr>
+          <p:nvPr/>
+        </p:nvPicPr>
+        <p:blipFill>
+          <a:blip r:embed="rId2">
+            <a:extLst>
+              <a:ext uri="{28A0092B-C50C-407E-A947-70E740481C1C}">
+                <a14:useLocalDpi xmlns:a14="http://schemas.microsoft.com/office/drawing/2010/main" val="0"/>
+              </a:ext>
+            </a:extLst>
+          </a:blip>
+          <a:stretch>
+            <a:fillRect/>
+          </a:stretch>
+        </p:blipFill>
+        <p:spPr>
+          <a:xfrm>
+            <a:off x="5914838" y="1362443"/>
+            <a:ext cx="3074526" cy="3074526"/>
+          </a:xfrm>
+          <a:prstGeom prst="rect">
+            <a:avLst/>
+          </a:prstGeom>
+        </p:spPr>
+      </p:pic>
+      <p:pic>
+        <p:nvPicPr>
+          <p:cNvPr id="5" name="Picture 2">
+            <a:extLst>
+              <a:ext uri="{FF2B5EF4-FFF2-40B4-BE49-F238E27FC236}">
+                <a16:creationId xmlns:a16="http://schemas.microsoft.com/office/drawing/2014/main" id="{E73FF380-DA72-4FC3-9D28-88185AFC535A}"/>
+              </a:ext>
+            </a:extLst>
+          </p:cNvPr>
+          <p:cNvPicPr>
+            <a:picLocks noChangeAspect="1"/>
+          </p:cNvPicPr>
+          <p:nvPr/>
+        </p:nvPicPr>
+        <p:blipFill>
+          <a:blip r:embed="rId3">
+            <a:extLst>
+              <a:ext uri="{28A0092B-C50C-407E-A947-70E740481C1C}">
+                <a14:useLocalDpi xmlns:a14="http://schemas.microsoft.com/office/drawing/2010/main" val="0"/>
+              </a:ext>
+            </a:extLst>
+          </a:blip>
+          <a:stretch>
+            <a:fillRect/>
+          </a:stretch>
+        </p:blipFill>
+        <p:spPr>
+          <a:xfrm>
+            <a:off x="279788" y="119843"/>
+            <a:ext cx="3744617" cy="3744617"/>
+          </a:xfrm>
+          <a:prstGeom prst="rect">
+            <a:avLst/>
+          </a:prstGeom>
+        </p:spPr>
+      </p:pic>
+      <p:pic>
+        <p:nvPicPr>
+          <p:cNvPr id="7" name="Picture 3">
+            <a:extLst>
+              <a:ext uri="{FF2B5EF4-FFF2-40B4-BE49-F238E27FC236}">
+                <a16:creationId xmlns:a16="http://schemas.microsoft.com/office/drawing/2014/main" id="{B06C5FDC-E008-498A-80A2-04DF225746FB}"/>
+              </a:ext>
+            </a:extLst>
+          </p:cNvPr>
+          <p:cNvPicPr>
+            <a:picLocks noChangeAspect="1"/>
+          </p:cNvPicPr>
+          <p:nvPr/>
+        </p:nvPicPr>
+        <p:blipFill>
+          <a:blip r:embed="rId4">
+            <a:extLst>
+              <a:ext uri="{28A0092B-C50C-407E-A947-70E740481C1C}">
+                <a14:useLocalDpi xmlns:a14="http://schemas.microsoft.com/office/drawing/2010/main" val="0"/>
+              </a:ext>
+            </a:extLst>
+          </a:blip>
+          <a:stretch>
+            <a:fillRect/>
+          </a:stretch>
+        </p:blipFill>
+        <p:spPr>
+          <a:xfrm>
+            <a:off x="2705882" y="1362443"/>
+            <a:ext cx="1193109" cy="1193109"/>
+          </a:xfrm>
+          <a:prstGeom prst="rect">
+            <a:avLst/>
+          </a:prstGeom>
+        </p:spPr>
+      </p:pic>
+      <p:pic>
+        <p:nvPicPr>
+          <p:cNvPr id="11" name="Picture 11">
+            <a:extLst>
+              <a:ext uri="{FF2B5EF4-FFF2-40B4-BE49-F238E27FC236}">
+                <a16:creationId xmlns:a16="http://schemas.microsoft.com/office/drawing/2014/main" id="{CEA91D39-2448-48D7-8A68-753A91CE94C1}"/>
+              </a:ext>
+            </a:extLst>
+          </p:cNvPr>
+          <p:cNvPicPr>
+            <a:picLocks noChangeAspect="1"/>
+          </p:cNvPicPr>
+          <p:nvPr/>
+        </p:nvPicPr>
+        <p:blipFill>
+          <a:blip r:embed="rId5">
+            <a:extLst>
+              <a:ext uri="{28A0092B-C50C-407E-A947-70E740481C1C}">
+                <a14:useLocalDpi xmlns:a14="http://schemas.microsoft.com/office/drawing/2010/main" val="0"/>
+              </a:ext>
+            </a:extLst>
+          </a:blip>
+          <a:stretch>
+            <a:fillRect/>
+          </a:stretch>
+        </p:blipFill>
+        <p:spPr>
+          <a:xfrm>
+            <a:off x="2248176" y="3746337"/>
+            <a:ext cx="2721445" cy="2721445"/>
+          </a:xfrm>
+          <a:prstGeom prst="rect">
+            <a:avLst/>
+          </a:prstGeom>
+        </p:spPr>
+      </p:pic>
+      <p:pic>
+        <p:nvPicPr>
+          <p:cNvPr id="3" name="Picture 3">
+            <a:extLst>
+              <a:ext uri="{FF2B5EF4-FFF2-40B4-BE49-F238E27FC236}">
+                <a16:creationId xmlns:a16="http://schemas.microsoft.com/office/drawing/2014/main" id="{8981669B-05E0-4947-BEA0-FD0280CC7C2B}"/>
+              </a:ext>
+            </a:extLst>
+          </p:cNvPr>
+          <p:cNvPicPr>
+            <a:picLocks noChangeAspect="1"/>
+          </p:cNvPicPr>
+          <p:nvPr/>
+        </p:nvPicPr>
+        <p:blipFill>
+          <a:blip r:embed="rId4">
+            <a:extLst>
+              <a:ext uri="{28A0092B-C50C-407E-A947-70E740481C1C}">
+                <a14:useLocalDpi xmlns:a14="http://schemas.microsoft.com/office/drawing/2010/main" val="0"/>
+              </a:ext>
+            </a:extLst>
+          </a:blip>
+          <a:stretch>
+            <a:fillRect/>
+          </a:stretch>
+        </p:blipFill>
+        <p:spPr>
+          <a:xfrm>
+            <a:off x="3115877" y="4436969"/>
+            <a:ext cx="986041" cy="986041"/>
+          </a:xfrm>
+          <a:prstGeom prst="rect">
+            <a:avLst/>
+          </a:prstGeom>
+        </p:spPr>
+      </p:pic>
+    </p:spTree>
+    <p:extLst>
+      <p:ext uri="{BB962C8B-B14F-4D97-AF65-F5344CB8AC3E}">
+        <p14:creationId xmlns:p14="http://schemas.microsoft.com/office/powerpoint/2010/main" val="1051890245"/>
+      </p:ext>
+    </p:extLst>
+  </p:cSld>
+  <p:clrMapOvr>
+    <a:masterClrMapping/>
+  </p:clrMapOvr>
+</p:sld>
+</file>
+
 <file path=ppt/slides/slide2.xml><?xml version="1.0" encoding="utf-8"?>
 <p:sld xmlns:a="http://schemas.openxmlformats.org/drawingml/2006/main" xmlns:r="http://schemas.openxmlformats.org/officeDocument/2006/relationships" xmlns:p="http://schemas.openxmlformats.org/presentationml/2006/main">
   <p:cSld>
@@ -3467,40 +5139,63 @@
           <a:chExt cx="0" cy="0"/>
         </a:xfrm>
       </p:grpSpPr>
-      <p:pic>
-        <p:nvPicPr>
-          <p:cNvPr id="6" name="Picture 5">
-            <a:extLst>
-              <a:ext uri="{FF2B5EF4-FFF2-40B4-BE49-F238E27FC236}">
-                <a16:creationId xmlns:a16="http://schemas.microsoft.com/office/drawing/2014/main" id="{8AE9B8B4-D7D7-46AC-9648-BA92763CD8DF}"/>
-              </a:ext>
-            </a:extLst>
-          </p:cNvPr>
-          <p:cNvPicPr>
-            <a:picLocks noChangeAspect="1"/>
-          </p:cNvPicPr>
-          <p:nvPr/>
-        </p:nvPicPr>
-        <p:blipFill>
-          <a:blip r:embed="rId2"/>
-          <a:stretch>
-            <a:fillRect/>
-          </a:stretch>
-        </p:blipFill>
-        <p:spPr>
-          <a:xfrm>
-            <a:off x="454925" y="284328"/>
-            <a:ext cx="10974201" cy="6470924"/>
-          </a:xfrm>
-          <a:prstGeom prst="rect">
-            <a:avLst/>
-          </a:prstGeom>
-        </p:spPr>
-      </p:pic>
+      <p:sp>
+        <p:nvSpPr>
+          <p:cNvPr id="2" name="Title 1">
+            <a:extLst>
+              <a:ext uri="{FF2B5EF4-FFF2-40B4-BE49-F238E27FC236}">
+                <a16:creationId xmlns:a16="http://schemas.microsoft.com/office/drawing/2014/main" id="{84476ED7-5B72-43DB-ADD7-4D5A3575BD5C}"/>
+              </a:ext>
+            </a:extLst>
+          </p:cNvPr>
+          <p:cNvSpPr>
+            <a:spLocks noGrp="1"/>
+          </p:cNvSpPr>
+          <p:nvPr>
+            <p:ph type="title"/>
+          </p:nvPr>
+        </p:nvSpPr>
+        <p:spPr/>
+        <p:txBody>
+          <a:bodyPr/>
+          <a:lstStyle/>
+          <a:p>
+            <a:r>
+              <a:rPr lang="en-US" dirty="0"/>
+              <a:t>High level</a:t>
+            </a:r>
+          </a:p>
+        </p:txBody>
+      </p:sp>
+      <p:sp>
+        <p:nvSpPr>
+          <p:cNvPr id="3" name="Text Placeholder 2">
+            <a:extLst>
+              <a:ext uri="{FF2B5EF4-FFF2-40B4-BE49-F238E27FC236}">
+                <a16:creationId xmlns:a16="http://schemas.microsoft.com/office/drawing/2014/main" id="{7EA0A255-6E1C-47AC-96A7-ECCCD8D608F2}"/>
+              </a:ext>
+            </a:extLst>
+          </p:cNvPr>
+          <p:cNvSpPr>
+            <a:spLocks noGrp="1"/>
+          </p:cNvSpPr>
+          <p:nvPr>
+            <p:ph type="body" idx="1"/>
+          </p:nvPr>
+        </p:nvSpPr>
+        <p:spPr/>
+        <p:txBody>
+          <a:bodyPr/>
+          <a:lstStyle/>
+          <a:p>
+            <a:endParaRPr lang="en-US"/>
+          </a:p>
+        </p:txBody>
+      </p:sp>
     </p:spTree>
     <p:extLst>
       <p:ext uri="{BB962C8B-B14F-4D97-AF65-F5344CB8AC3E}">
-        <p14:creationId xmlns:p14="http://schemas.microsoft.com/office/powerpoint/2010/main" val="3294991747"/>
+        <p14:creationId xmlns:p14="http://schemas.microsoft.com/office/powerpoint/2010/main" val="3483284902"/>
       </p:ext>
     </p:extLst>
   </p:cSld>
@@ -3529,10 +5224,10 @@
       </p:grpSpPr>
       <p:pic>
         <p:nvPicPr>
-          <p:cNvPr id="4" name="Picture 3">
-            <a:extLst>
-              <a:ext uri="{FF2B5EF4-FFF2-40B4-BE49-F238E27FC236}">
-                <a16:creationId xmlns:a16="http://schemas.microsoft.com/office/drawing/2014/main" id="{06B3B9B2-6749-4686-AD35-ACB77256E3E1}"/>
+          <p:cNvPr id="3" name="Picture 2">
+            <a:extLst>
+              <a:ext uri="{FF2B5EF4-FFF2-40B4-BE49-F238E27FC236}">
+                <a16:creationId xmlns:a16="http://schemas.microsoft.com/office/drawing/2014/main" id="{875913E5-D7FA-4FC7-99A4-6B6B032AD6C0}"/>
               </a:ext>
             </a:extLst>
           </p:cNvPr>
@@ -3549,38 +5244,8 @@
         </p:blipFill>
         <p:spPr>
           <a:xfrm>
-            <a:off x="0" y="1"/>
+            <a:off x="2869282" y="361627"/>
             <a:ext cx="6453435" cy="6134746"/>
-          </a:xfrm>
-          <a:prstGeom prst="rect">
-            <a:avLst/>
-          </a:prstGeom>
-        </p:spPr>
-      </p:pic>
-      <p:pic>
-        <p:nvPicPr>
-          <p:cNvPr id="7" name="Picture 6">
-            <a:extLst>
-              <a:ext uri="{FF2B5EF4-FFF2-40B4-BE49-F238E27FC236}">
-                <a16:creationId xmlns:a16="http://schemas.microsoft.com/office/drawing/2014/main" id="{BF67A69E-0738-44B3-8D36-D05D1DA89F5B}"/>
-              </a:ext>
-            </a:extLst>
-          </p:cNvPr>
-          <p:cNvPicPr>
-            <a:picLocks noChangeAspect="1"/>
-          </p:cNvPicPr>
-          <p:nvPr/>
-        </p:nvPicPr>
-        <p:blipFill>
-          <a:blip r:embed="rId3"/>
-          <a:stretch>
-            <a:fillRect/>
-          </a:stretch>
-        </p:blipFill>
-        <p:spPr>
-          <a:xfrm>
-            <a:off x="6291343" y="-1"/>
-            <a:ext cx="5900658" cy="6247755"/>
           </a:xfrm>
           <a:prstGeom prst="rect">
             <a:avLst/>
@@ -3590,7 +5255,7 @@
     </p:spTree>
     <p:extLst>
       <p:ext uri="{BB962C8B-B14F-4D97-AF65-F5344CB8AC3E}">
-        <p14:creationId xmlns:p14="http://schemas.microsoft.com/office/powerpoint/2010/main" val="1160830767"/>
+        <p14:creationId xmlns:p14="http://schemas.microsoft.com/office/powerpoint/2010/main" val="2986720350"/>
       </p:ext>
     </p:extLst>
   </p:cSld>
@@ -3617,238 +5282,12 @@
           <a:chExt cx="0" cy="0"/>
         </a:xfrm>
       </p:grpSpPr>
-      <p:cxnSp>
-        <p:nvCxnSpPr>
-          <p:cNvPr id="2" name="Straight Arrow Connector 1">
-            <a:extLst>
-              <a:ext uri="{FF2B5EF4-FFF2-40B4-BE49-F238E27FC236}">
-                <a16:creationId xmlns:a16="http://schemas.microsoft.com/office/drawing/2014/main" id="{FC7C411A-7FF6-4365-B951-2F18B5CC188C}"/>
-              </a:ext>
-            </a:extLst>
-          </p:cNvPr>
-          <p:cNvCxnSpPr>
-            <a:cxnSpLocks/>
-          </p:cNvCxnSpPr>
-          <p:nvPr/>
-        </p:nvCxnSpPr>
-        <p:spPr>
-          <a:xfrm>
-            <a:off x="2534619" y="2211737"/>
-            <a:ext cx="0" cy="1420678"/>
-          </a:xfrm>
-          <a:prstGeom prst="straightConnector1">
-            <a:avLst/>
-          </a:prstGeom>
-        </p:spPr>
-        <p:style>
-          <a:lnRef idx="3">
-            <a:schemeClr val="dk1"/>
-          </a:lnRef>
-          <a:fillRef idx="0">
-            <a:schemeClr val="dk1"/>
-          </a:fillRef>
-          <a:effectRef idx="2">
-            <a:schemeClr val="dk1"/>
-          </a:effectRef>
-          <a:fontRef idx="minor">
-            <a:schemeClr val="tx1"/>
-          </a:fontRef>
-        </p:style>
-      </p:cxnSp>
-      <p:sp>
-        <p:nvSpPr>
-          <p:cNvPr id="16" name="Rectangle 15">
-            <a:extLst>
-              <a:ext uri="{FF2B5EF4-FFF2-40B4-BE49-F238E27FC236}">
-                <a16:creationId xmlns:a16="http://schemas.microsoft.com/office/drawing/2014/main" id="{3D56F7A0-0DD4-4580-A120-CE3EE870B968}"/>
-              </a:ext>
-            </a:extLst>
-          </p:cNvPr>
-          <p:cNvSpPr/>
-          <p:nvPr/>
-        </p:nvSpPr>
-        <p:spPr>
-          <a:xfrm>
-            <a:off x="1620219" y="2922076"/>
-            <a:ext cx="1828800" cy="1828800"/>
-          </a:xfrm>
-          <a:prstGeom prst="rect">
-            <a:avLst/>
-          </a:prstGeom>
-          <a:noFill/>
-          <a:ln>
-            <a:solidFill>
-              <a:schemeClr val="tx1"/>
-            </a:solidFill>
-          </a:ln>
-        </p:spPr>
-        <p:style>
-          <a:lnRef idx="2">
-            <a:schemeClr val="dk1"/>
-          </a:lnRef>
-          <a:fillRef idx="1">
-            <a:schemeClr val="lt1"/>
-          </a:fillRef>
-          <a:effectRef idx="0">
-            <a:schemeClr val="dk1"/>
-          </a:effectRef>
-          <a:fontRef idx="minor">
-            <a:schemeClr val="dk1"/>
-          </a:fontRef>
-        </p:style>
-        <p:txBody>
-          <a:bodyPr rtlCol="0" anchor="ctr"/>
-          <a:lstStyle/>
-          <a:p>
-            <a:pPr algn="ctr"/>
-            <a:endParaRPr lang="en-US"/>
-          </a:p>
-        </p:txBody>
-      </p:sp>
-      <p:sp>
-        <p:nvSpPr>
-          <p:cNvPr id="18" name="Rectangle 17">
-            <a:extLst>
-              <a:ext uri="{FF2B5EF4-FFF2-40B4-BE49-F238E27FC236}">
-                <a16:creationId xmlns:a16="http://schemas.microsoft.com/office/drawing/2014/main" id="{FB1DE2F0-70CD-4526-94D0-953BFECB7A2F}"/>
-              </a:ext>
-            </a:extLst>
-          </p:cNvPr>
-          <p:cNvSpPr/>
-          <p:nvPr/>
-        </p:nvSpPr>
-        <p:spPr>
-          <a:xfrm>
-            <a:off x="1368650" y="3632415"/>
-            <a:ext cx="2331937" cy="1828800"/>
-          </a:xfrm>
-          <a:prstGeom prst="rect">
-            <a:avLst/>
-          </a:prstGeom>
-          <a:solidFill>
-            <a:schemeClr val="bg1"/>
-          </a:solidFill>
-          <a:ln>
-            <a:noFill/>
-          </a:ln>
-        </p:spPr>
-        <p:style>
-          <a:lnRef idx="2">
-            <a:schemeClr val="dk1"/>
-          </a:lnRef>
-          <a:fillRef idx="1">
-            <a:schemeClr val="lt1"/>
-          </a:fillRef>
-          <a:effectRef idx="0">
-            <a:schemeClr val="dk1"/>
-          </a:effectRef>
-          <a:fontRef idx="minor">
-            <a:schemeClr val="dk1"/>
-          </a:fontRef>
-        </p:style>
-        <p:txBody>
-          <a:bodyPr rtlCol="0" anchor="ctr"/>
-          <a:lstStyle/>
-          <a:p>
-            <a:pPr algn="ctr"/>
-            <a:endParaRPr lang="en-US"/>
-          </a:p>
-        </p:txBody>
-      </p:sp>
-      <p:sp>
-        <p:nvSpPr>
-          <p:cNvPr id="20" name="Flowchart: Terminator 19">
-            <a:extLst>
-              <a:ext uri="{FF2B5EF4-FFF2-40B4-BE49-F238E27FC236}">
-                <a16:creationId xmlns:a16="http://schemas.microsoft.com/office/drawing/2014/main" id="{8D24B2F4-D525-40AE-8FE7-EB6BDA12C435}"/>
-              </a:ext>
-            </a:extLst>
-          </p:cNvPr>
-          <p:cNvSpPr/>
-          <p:nvPr/>
-        </p:nvSpPr>
-        <p:spPr>
-          <a:xfrm>
-            <a:off x="3700586" y="1054219"/>
-            <a:ext cx="2395399" cy="1157518"/>
-          </a:xfrm>
-          <a:prstGeom prst="flowChartTerminator">
-            <a:avLst/>
-          </a:prstGeom>
-        </p:spPr>
-        <p:style>
-          <a:lnRef idx="2">
-            <a:schemeClr val="dk1"/>
-          </a:lnRef>
-          <a:fillRef idx="1">
-            <a:schemeClr val="lt1"/>
-          </a:fillRef>
-          <a:effectRef idx="0">
-            <a:schemeClr val="dk1"/>
-          </a:effectRef>
-          <a:fontRef idx="minor">
-            <a:schemeClr val="dk1"/>
-          </a:fontRef>
-        </p:style>
-        <p:txBody>
-          <a:bodyPr rtlCol="0" anchor="ctr"/>
-          <a:lstStyle/>
-          <a:p>
-            <a:pPr algn="ctr"/>
-            <a:endParaRPr lang="en-US"/>
-          </a:p>
-        </p:txBody>
-      </p:sp>
-      <p:sp>
-        <p:nvSpPr>
-          <p:cNvPr id="23" name="Rectangle 22">
-            <a:extLst>
-              <a:ext uri="{FF2B5EF4-FFF2-40B4-BE49-F238E27FC236}">
-                <a16:creationId xmlns:a16="http://schemas.microsoft.com/office/drawing/2014/main" id="{B3E382DF-292B-4AC4-83D7-5175BE806854}"/>
-              </a:ext>
-            </a:extLst>
-          </p:cNvPr>
-          <p:cNvSpPr/>
-          <p:nvPr/>
-        </p:nvSpPr>
-        <p:spPr>
-          <a:xfrm>
-            <a:off x="4792959" y="4417687"/>
-            <a:ext cx="2062038" cy="969264"/>
-          </a:xfrm>
-          <a:prstGeom prst="rect">
-            <a:avLst/>
-          </a:prstGeom>
-        </p:spPr>
-        <p:style>
-          <a:lnRef idx="2">
-            <a:schemeClr val="dk1"/>
-          </a:lnRef>
-          <a:fillRef idx="1">
-            <a:schemeClr val="lt1"/>
-          </a:fillRef>
-          <a:effectRef idx="0">
-            <a:schemeClr val="dk1"/>
-          </a:effectRef>
-          <a:fontRef idx="minor">
-            <a:schemeClr val="dk1"/>
-          </a:fontRef>
-        </p:style>
-        <p:txBody>
-          <a:bodyPr rtlCol="0" anchor="ctr"/>
-          <a:lstStyle/>
-          <a:p>
-            <a:pPr algn="ctr"/>
-            <a:endParaRPr lang="en-US"/>
-          </a:p>
-        </p:txBody>
-      </p:sp>
       <p:pic>
         <p:nvPicPr>
-          <p:cNvPr id="9" name="Picture 8">
-            <a:extLst>
-              <a:ext uri="{FF2B5EF4-FFF2-40B4-BE49-F238E27FC236}">
-                <a16:creationId xmlns:a16="http://schemas.microsoft.com/office/drawing/2014/main" id="{BE230AFA-6692-43C5-A838-F1E762CDE0BC}"/>
+          <p:cNvPr id="4" name="Picture 3">
+            <a:extLst>
+              <a:ext uri="{FF2B5EF4-FFF2-40B4-BE49-F238E27FC236}">
+                <a16:creationId xmlns:a16="http://schemas.microsoft.com/office/drawing/2014/main" id="{1AA1DEAE-1ADC-4CBD-B3B8-9FCE65826B69}"/>
               </a:ext>
             </a:extLst>
           </p:cNvPr>
@@ -3857,607 +5296,26 @@
           </p:cNvPicPr>
           <p:nvPr/>
         </p:nvPicPr>
-        <p:blipFill rotWithShape="1">
+        <p:blipFill>
           <a:blip r:embed="rId2"/>
-          <a:srcRect l="1" t="-1" r="-8177" b="27194"/>
-          <a:stretch/>
+          <a:stretch>
+            <a:fillRect/>
+          </a:stretch>
         </p:blipFill>
         <p:spPr>
           <a:xfrm>
-            <a:off x="4872418" y="1414092"/>
-            <a:ext cx="1067969" cy="597081"/>
+            <a:off x="2461359" y="613865"/>
+            <a:ext cx="6691531" cy="5630270"/>
           </a:xfrm>
           <a:prstGeom prst="rect">
             <a:avLst/>
           </a:prstGeom>
         </p:spPr>
       </p:pic>
-      <p:sp>
-        <p:nvSpPr>
-          <p:cNvPr id="29" name="Isosceles Triangle 28">
-            <a:extLst>
-              <a:ext uri="{FF2B5EF4-FFF2-40B4-BE49-F238E27FC236}">
-                <a16:creationId xmlns:a16="http://schemas.microsoft.com/office/drawing/2014/main" id="{127C05EF-9921-4E7A-A67D-86853ADF73B5}"/>
-              </a:ext>
-            </a:extLst>
-          </p:cNvPr>
-          <p:cNvSpPr/>
-          <p:nvPr/>
-        </p:nvSpPr>
-        <p:spPr>
-          <a:xfrm>
-            <a:off x="6283577" y="5098941"/>
-            <a:ext cx="620260" cy="247018"/>
-          </a:xfrm>
-          <a:prstGeom prst="triangle">
-            <a:avLst/>
-          </a:prstGeom>
-        </p:spPr>
-        <p:style>
-          <a:lnRef idx="2">
-            <a:schemeClr val="dk1">
-              <a:shade val="50000"/>
-            </a:schemeClr>
-          </a:lnRef>
-          <a:fillRef idx="1">
-            <a:schemeClr val="dk1"/>
-          </a:fillRef>
-          <a:effectRef idx="0">
-            <a:schemeClr val="dk1"/>
-          </a:effectRef>
-          <a:fontRef idx="minor">
-            <a:schemeClr val="lt1"/>
-          </a:fontRef>
-        </p:style>
-        <p:txBody>
-          <a:bodyPr rtlCol="0" anchor="ctr"/>
-          <a:lstStyle/>
-          <a:p>
-            <a:pPr algn="ctr"/>
-            <a:endParaRPr lang="en-US"/>
-          </a:p>
-        </p:txBody>
-      </p:sp>
-      <p:sp>
-        <p:nvSpPr>
-          <p:cNvPr id="31" name="Isosceles Triangle 30">
-            <a:extLst>
-              <a:ext uri="{FF2B5EF4-FFF2-40B4-BE49-F238E27FC236}">
-                <a16:creationId xmlns:a16="http://schemas.microsoft.com/office/drawing/2014/main" id="{376560B8-763F-4C6F-A4B6-6FD208CD7E00}"/>
-              </a:ext>
-            </a:extLst>
-          </p:cNvPr>
-          <p:cNvSpPr/>
-          <p:nvPr/>
-        </p:nvSpPr>
-        <p:spPr>
-          <a:xfrm rot="10800000">
-            <a:off x="6274536" y="4783163"/>
-            <a:ext cx="620260" cy="247018"/>
-          </a:xfrm>
-          <a:prstGeom prst="triangle">
-            <a:avLst/>
-          </a:prstGeom>
-        </p:spPr>
-        <p:style>
-          <a:lnRef idx="2">
-            <a:schemeClr val="dk1">
-              <a:shade val="50000"/>
-            </a:schemeClr>
-          </a:lnRef>
-          <a:fillRef idx="1">
-            <a:schemeClr val="dk1"/>
-          </a:fillRef>
-          <a:effectRef idx="0">
-            <a:schemeClr val="dk1"/>
-          </a:effectRef>
-          <a:fontRef idx="minor">
-            <a:schemeClr val="lt1"/>
-          </a:fontRef>
-        </p:style>
-        <p:txBody>
-          <a:bodyPr rtlCol="0" anchor="ctr"/>
-          <a:lstStyle/>
-          <a:p>
-            <a:pPr algn="ctr"/>
-            <a:endParaRPr lang="en-US"/>
-          </a:p>
-        </p:txBody>
-      </p:sp>
-      <p:sp>
-        <p:nvSpPr>
-          <p:cNvPr id="32" name="Flowchart: Off-page Connector 31">
-            <a:extLst>
-              <a:ext uri="{FF2B5EF4-FFF2-40B4-BE49-F238E27FC236}">
-                <a16:creationId xmlns:a16="http://schemas.microsoft.com/office/drawing/2014/main" id="{8DF8B7CF-214B-4A74-865C-E7EEC5E5828F}"/>
-              </a:ext>
-            </a:extLst>
-          </p:cNvPr>
-          <p:cNvSpPr/>
-          <p:nvPr/>
-        </p:nvSpPr>
-        <p:spPr>
-          <a:xfrm rot="16200000" flipH="1">
-            <a:off x="1800302" y="3828037"/>
-            <a:ext cx="1265178" cy="2444172"/>
-          </a:xfrm>
-          <a:prstGeom prst="flowChartOffpageConnector">
-            <a:avLst/>
-          </a:prstGeom>
-        </p:spPr>
-        <p:style>
-          <a:lnRef idx="2">
-            <a:schemeClr val="dk1"/>
-          </a:lnRef>
-          <a:fillRef idx="1">
-            <a:schemeClr val="lt1"/>
-          </a:fillRef>
-          <a:effectRef idx="0">
-            <a:schemeClr val="dk1"/>
-          </a:effectRef>
-          <a:fontRef idx="minor">
-            <a:schemeClr val="dk1"/>
-          </a:fontRef>
-        </p:style>
-        <p:txBody>
-          <a:bodyPr rtlCol="0" anchor="ctr"/>
-          <a:lstStyle/>
-          <a:p>
-            <a:pPr algn="ctr"/>
-            <a:endParaRPr lang="en-US"/>
-          </a:p>
-        </p:txBody>
-      </p:sp>
-      <p:sp>
-        <p:nvSpPr>
-          <p:cNvPr id="6" name="Flowchart: Connector 5">
-            <a:extLst>
-              <a:ext uri="{FF2B5EF4-FFF2-40B4-BE49-F238E27FC236}">
-                <a16:creationId xmlns:a16="http://schemas.microsoft.com/office/drawing/2014/main" id="{A79456F7-D5E1-4F40-A681-3E39572BCD17}"/>
-              </a:ext>
-            </a:extLst>
-          </p:cNvPr>
-          <p:cNvSpPr/>
-          <p:nvPr/>
-        </p:nvSpPr>
-        <p:spPr>
-          <a:xfrm>
-            <a:off x="6418097" y="898590"/>
-            <a:ext cx="1225296" cy="1225658"/>
-          </a:xfrm>
-          <a:prstGeom prst="flowChartConnector">
-            <a:avLst/>
-          </a:prstGeom>
-        </p:spPr>
-        <p:style>
-          <a:lnRef idx="2">
-            <a:schemeClr val="dk1"/>
-          </a:lnRef>
-          <a:fillRef idx="1">
-            <a:schemeClr val="lt1"/>
-          </a:fillRef>
-          <a:effectRef idx="0">
-            <a:schemeClr val="dk1"/>
-          </a:effectRef>
-          <a:fontRef idx="minor">
-            <a:schemeClr val="dk1"/>
-          </a:fontRef>
-        </p:style>
-        <p:txBody>
-          <a:bodyPr rtlCol="0" anchor="ctr"/>
-          <a:lstStyle/>
-          <a:p>
-            <a:pPr algn="ctr"/>
-            <a:endParaRPr lang="en-US"/>
-          </a:p>
-        </p:txBody>
-      </p:sp>
-      <p:sp>
-        <p:nvSpPr>
-          <p:cNvPr id="4" name="Flowchart: Connector 3">
-            <a:extLst>
-              <a:ext uri="{FF2B5EF4-FFF2-40B4-BE49-F238E27FC236}">
-                <a16:creationId xmlns:a16="http://schemas.microsoft.com/office/drawing/2014/main" id="{58EC6F50-1ECB-4CEE-B48B-73E1B3DA38DD}"/>
-              </a:ext>
-            </a:extLst>
-          </p:cNvPr>
-          <p:cNvSpPr/>
-          <p:nvPr/>
-        </p:nvSpPr>
-        <p:spPr>
-          <a:xfrm>
-            <a:off x="6589689" y="1054219"/>
-            <a:ext cx="914400" cy="914400"/>
-          </a:xfrm>
-          <a:prstGeom prst="flowChartConnector">
-            <a:avLst/>
-          </a:prstGeom>
-        </p:spPr>
-        <p:style>
-          <a:lnRef idx="2">
-            <a:schemeClr val="dk1">
-              <a:shade val="50000"/>
-            </a:schemeClr>
-          </a:lnRef>
-          <a:fillRef idx="1">
-            <a:schemeClr val="dk1"/>
-          </a:fillRef>
-          <a:effectRef idx="0">
-            <a:schemeClr val="dk1"/>
-          </a:effectRef>
-          <a:fontRef idx="minor">
-            <a:schemeClr val="lt1"/>
-          </a:fontRef>
-        </p:style>
-        <p:txBody>
-          <a:bodyPr rtlCol="0" anchor="ctr"/>
-          <a:lstStyle/>
-          <a:p>
-            <a:pPr algn="ctr"/>
-            <a:endParaRPr lang="en-US"/>
-          </a:p>
-        </p:txBody>
-      </p:sp>
-      <p:sp>
-        <p:nvSpPr>
-          <p:cNvPr id="5" name="Flowchart: Summing Junction 4">
-            <a:extLst>
-              <a:ext uri="{FF2B5EF4-FFF2-40B4-BE49-F238E27FC236}">
-                <a16:creationId xmlns:a16="http://schemas.microsoft.com/office/drawing/2014/main" id="{8A822004-C1FD-4076-814C-0A778E631ED8}"/>
-              </a:ext>
-            </a:extLst>
-          </p:cNvPr>
-          <p:cNvSpPr/>
-          <p:nvPr/>
-        </p:nvSpPr>
-        <p:spPr>
-          <a:xfrm>
-            <a:off x="351287" y="128403"/>
-            <a:ext cx="1225296" cy="1225296"/>
-          </a:xfrm>
-          <a:prstGeom prst="flowChartSummingJunction">
-            <a:avLst/>
-          </a:prstGeom>
-        </p:spPr>
-        <p:style>
-          <a:lnRef idx="2">
-            <a:schemeClr val="dk1"/>
-          </a:lnRef>
-          <a:fillRef idx="1">
-            <a:schemeClr val="lt1"/>
-          </a:fillRef>
-          <a:effectRef idx="0">
-            <a:schemeClr val="dk1"/>
-          </a:effectRef>
-          <a:fontRef idx="minor">
-            <a:schemeClr val="dk1"/>
-          </a:fontRef>
-        </p:style>
-        <p:txBody>
-          <a:bodyPr rtlCol="0" anchor="ctr"/>
-          <a:lstStyle/>
-          <a:p>
-            <a:pPr algn="ctr"/>
-            <a:endParaRPr lang="en-US"/>
-          </a:p>
-        </p:txBody>
-      </p:sp>
-      <p:cxnSp>
-        <p:nvCxnSpPr>
-          <p:cNvPr id="7" name="Straight Arrow Connector 6">
-            <a:extLst>
-              <a:ext uri="{FF2B5EF4-FFF2-40B4-BE49-F238E27FC236}">
-                <a16:creationId xmlns:a16="http://schemas.microsoft.com/office/drawing/2014/main" id="{D48EFB5E-CE10-4ABF-A875-B0384B0035BB}"/>
-              </a:ext>
-            </a:extLst>
-          </p:cNvPr>
-          <p:cNvCxnSpPr>
-            <a:cxnSpLocks/>
-          </p:cNvCxnSpPr>
-          <p:nvPr/>
-        </p:nvCxnSpPr>
-        <p:spPr>
-          <a:xfrm flipH="1">
-            <a:off x="9714491" y="-18874"/>
-            <a:ext cx="1331" cy="3221711"/>
-          </a:xfrm>
-          <a:prstGeom prst="straightConnector1">
-            <a:avLst/>
-          </a:prstGeom>
-        </p:spPr>
-        <p:style>
-          <a:lnRef idx="2">
-            <a:schemeClr val="dk1"/>
-          </a:lnRef>
-          <a:fillRef idx="0">
-            <a:schemeClr val="dk1"/>
-          </a:fillRef>
-          <a:effectRef idx="1">
-            <a:schemeClr val="dk1"/>
-          </a:effectRef>
-          <a:fontRef idx="minor">
-            <a:schemeClr val="tx1"/>
-          </a:fontRef>
-        </p:style>
-      </p:cxnSp>
-      <p:cxnSp>
-        <p:nvCxnSpPr>
-          <p:cNvPr id="11" name="Straight Arrow Connector 10">
-            <a:extLst>
-              <a:ext uri="{FF2B5EF4-FFF2-40B4-BE49-F238E27FC236}">
-                <a16:creationId xmlns:a16="http://schemas.microsoft.com/office/drawing/2014/main" id="{101488DF-FFC1-47FC-A6F1-4114B1FA3A32}"/>
-              </a:ext>
-            </a:extLst>
-          </p:cNvPr>
-          <p:cNvCxnSpPr>
-            <a:cxnSpLocks/>
-          </p:cNvCxnSpPr>
-          <p:nvPr/>
-        </p:nvCxnSpPr>
-        <p:spPr>
-          <a:xfrm flipH="1">
-            <a:off x="7989193" y="1602298"/>
-            <a:ext cx="3424664" cy="0"/>
-          </a:xfrm>
-          <a:prstGeom prst="straightConnector1">
-            <a:avLst/>
-          </a:prstGeom>
-        </p:spPr>
-        <p:style>
-          <a:lnRef idx="2">
-            <a:schemeClr val="dk1"/>
-          </a:lnRef>
-          <a:fillRef idx="0">
-            <a:schemeClr val="dk1"/>
-          </a:fillRef>
-          <a:effectRef idx="1">
-            <a:schemeClr val="dk1"/>
-          </a:effectRef>
-          <a:fontRef idx="minor">
-            <a:schemeClr val="tx1"/>
-          </a:fontRef>
-        </p:style>
-      </p:cxnSp>
-      <p:sp>
-        <p:nvSpPr>
-          <p:cNvPr id="3" name="Flowchart: Decision 2">
-            <a:extLst>
-              <a:ext uri="{FF2B5EF4-FFF2-40B4-BE49-F238E27FC236}">
-                <a16:creationId xmlns:a16="http://schemas.microsoft.com/office/drawing/2014/main" id="{894AF778-3906-4228-90CD-3997E2AD25D8}"/>
-              </a:ext>
-            </a:extLst>
-          </p:cNvPr>
-          <p:cNvSpPr/>
-          <p:nvPr/>
-        </p:nvSpPr>
-        <p:spPr>
-          <a:xfrm>
-            <a:off x="8787125" y="989650"/>
-            <a:ext cx="1828800" cy="1225296"/>
-          </a:xfrm>
-          <a:prstGeom prst="flowChartDecision">
-            <a:avLst/>
-          </a:prstGeom>
-        </p:spPr>
-        <p:style>
-          <a:lnRef idx="2">
-            <a:schemeClr val="dk1"/>
-          </a:lnRef>
-          <a:fillRef idx="1">
-            <a:schemeClr val="lt1"/>
-          </a:fillRef>
-          <a:effectRef idx="0">
-            <a:schemeClr val="dk1"/>
-          </a:effectRef>
-          <a:fontRef idx="minor">
-            <a:schemeClr val="dk1"/>
-          </a:fontRef>
-        </p:style>
-        <p:txBody>
-          <a:bodyPr rtlCol="0" anchor="ctr"/>
-          <a:lstStyle/>
-          <a:p>
-            <a:pPr algn="ctr"/>
-            <a:endParaRPr lang="en-US"/>
-          </a:p>
-        </p:txBody>
-      </p:sp>
-      <p:sp>
-        <p:nvSpPr>
-          <p:cNvPr id="24" name="TextBox 23">
-            <a:extLst>
-              <a:ext uri="{FF2B5EF4-FFF2-40B4-BE49-F238E27FC236}">
-                <a16:creationId xmlns:a16="http://schemas.microsoft.com/office/drawing/2014/main" id="{07D48274-F408-4E58-8C7B-2C738F5CFFCF}"/>
-              </a:ext>
-            </a:extLst>
-          </p:cNvPr>
-          <p:cNvSpPr txBox="1"/>
-          <p:nvPr/>
-        </p:nvSpPr>
-        <p:spPr>
-          <a:xfrm>
-            <a:off x="9472049" y="1213651"/>
-            <a:ext cx="779435" cy="707886"/>
-          </a:xfrm>
-          <a:prstGeom prst="rect">
-            <a:avLst/>
-          </a:prstGeom>
-          <a:noFill/>
-        </p:spPr>
-        <p:txBody>
-          <a:bodyPr wrap="square" rtlCol="0">
-            <a:spAutoFit/>
-          </a:bodyPr>
-          <a:lstStyle/>
-          <a:p>
-            <a:pPr algn="l"/>
-            <a:r>
-              <a:rPr lang="en-US" sz="4000" dirty="0"/>
-              <a:t>IF</a:t>
-            </a:r>
-          </a:p>
-        </p:txBody>
-      </p:sp>
-      <p:cxnSp>
-        <p:nvCxnSpPr>
-          <p:cNvPr id="14" name="Straight Arrow Connector 13">
-            <a:extLst>
-              <a:ext uri="{FF2B5EF4-FFF2-40B4-BE49-F238E27FC236}">
-                <a16:creationId xmlns:a16="http://schemas.microsoft.com/office/drawing/2014/main" id="{938023AD-2B37-44B5-B895-08923EA07627}"/>
-              </a:ext>
-            </a:extLst>
-          </p:cNvPr>
-          <p:cNvCxnSpPr>
-            <a:cxnSpLocks/>
-          </p:cNvCxnSpPr>
-          <p:nvPr/>
-        </p:nvCxnSpPr>
-        <p:spPr>
-          <a:xfrm flipH="1">
-            <a:off x="9866891" y="3558850"/>
-            <a:ext cx="1331" cy="3221711"/>
-          </a:xfrm>
-          <a:prstGeom prst="straightConnector1">
-            <a:avLst/>
-          </a:prstGeom>
-        </p:spPr>
-        <p:style>
-          <a:lnRef idx="2">
-            <a:schemeClr val="dk1"/>
-          </a:lnRef>
-          <a:fillRef idx="0">
-            <a:schemeClr val="dk1"/>
-          </a:fillRef>
-          <a:effectRef idx="1">
-            <a:schemeClr val="dk1"/>
-          </a:effectRef>
-          <a:fontRef idx="minor">
-            <a:schemeClr val="tx1"/>
-          </a:fontRef>
-        </p:style>
-      </p:cxnSp>
-      <p:cxnSp>
-        <p:nvCxnSpPr>
-          <p:cNvPr id="15" name="Straight Arrow Connector 14">
-            <a:extLst>
-              <a:ext uri="{FF2B5EF4-FFF2-40B4-BE49-F238E27FC236}">
-                <a16:creationId xmlns:a16="http://schemas.microsoft.com/office/drawing/2014/main" id="{E58D0140-56C9-42E6-B2EE-685806EB7765}"/>
-              </a:ext>
-            </a:extLst>
-          </p:cNvPr>
-          <p:cNvCxnSpPr>
-            <a:cxnSpLocks/>
-          </p:cNvCxnSpPr>
-          <p:nvPr/>
-        </p:nvCxnSpPr>
-        <p:spPr>
-          <a:xfrm flipH="1">
-            <a:off x="8141593" y="5180022"/>
-            <a:ext cx="3424664" cy="0"/>
-          </a:xfrm>
-          <a:prstGeom prst="straightConnector1">
-            <a:avLst/>
-          </a:prstGeom>
-        </p:spPr>
-        <p:style>
-          <a:lnRef idx="2">
-            <a:schemeClr val="dk1"/>
-          </a:lnRef>
-          <a:fillRef idx="0">
-            <a:schemeClr val="dk1"/>
-          </a:fillRef>
-          <a:effectRef idx="1">
-            <a:schemeClr val="dk1"/>
-          </a:effectRef>
-          <a:fontRef idx="minor">
-            <a:schemeClr val="tx1"/>
-          </a:fontRef>
-        </p:style>
-      </p:cxnSp>
-      <p:sp>
-        <p:nvSpPr>
-          <p:cNvPr id="17" name="Flowchart: Decision 16">
-            <a:extLst>
-              <a:ext uri="{FF2B5EF4-FFF2-40B4-BE49-F238E27FC236}">
-                <a16:creationId xmlns:a16="http://schemas.microsoft.com/office/drawing/2014/main" id="{D1D937C6-6960-44AF-B040-E59F354A795B}"/>
-              </a:ext>
-            </a:extLst>
-          </p:cNvPr>
-          <p:cNvSpPr/>
-          <p:nvPr/>
-        </p:nvSpPr>
-        <p:spPr>
-          <a:xfrm>
-            <a:off x="8939525" y="4567374"/>
-            <a:ext cx="1828800" cy="1225296"/>
-          </a:xfrm>
-          <a:prstGeom prst="flowChartDecision">
-            <a:avLst/>
-          </a:prstGeom>
-        </p:spPr>
-        <p:style>
-          <a:lnRef idx="2">
-            <a:schemeClr val="dk1"/>
-          </a:lnRef>
-          <a:fillRef idx="1">
-            <a:schemeClr val="lt1"/>
-          </a:fillRef>
-          <a:effectRef idx="0">
-            <a:schemeClr val="dk1"/>
-          </a:effectRef>
-          <a:fontRef idx="minor">
-            <a:schemeClr val="dk1"/>
-          </a:fontRef>
-        </p:style>
-        <p:txBody>
-          <a:bodyPr rtlCol="0" anchor="ctr"/>
-          <a:lstStyle/>
-          <a:p>
-            <a:pPr algn="ctr"/>
-            <a:endParaRPr lang="en-US"/>
-          </a:p>
-        </p:txBody>
-      </p:sp>
-      <p:sp>
-        <p:nvSpPr>
-          <p:cNvPr id="27" name="TextBox 26">
-            <a:extLst>
-              <a:ext uri="{FF2B5EF4-FFF2-40B4-BE49-F238E27FC236}">
-                <a16:creationId xmlns:a16="http://schemas.microsoft.com/office/drawing/2014/main" id="{63F8C744-654F-43D5-AA9B-7611CF512144}"/>
-              </a:ext>
-            </a:extLst>
-          </p:cNvPr>
-          <p:cNvSpPr txBox="1"/>
-          <p:nvPr/>
-        </p:nvSpPr>
-        <p:spPr>
-          <a:xfrm>
-            <a:off x="9213605" y="4882960"/>
-            <a:ext cx="1263547" cy="538609"/>
-          </a:xfrm>
-          <a:prstGeom prst="rect">
-            <a:avLst/>
-          </a:prstGeom>
-          <a:noFill/>
-        </p:spPr>
-        <p:txBody>
-          <a:bodyPr wrap="square" rtlCol="0">
-            <a:spAutoFit/>
-          </a:bodyPr>
-          <a:lstStyle/>
-          <a:p>
-            <a:pPr algn="ctr"/>
-            <a:r>
-              <a:rPr lang="en-US" sz="2900" dirty="0"/>
-              <a:t>Repeat</a:t>
-            </a:r>
-          </a:p>
-        </p:txBody>
-      </p:sp>
     </p:spTree>
     <p:extLst>
       <p:ext uri="{BB962C8B-B14F-4D97-AF65-F5344CB8AC3E}">
-        <p14:creationId xmlns:p14="http://schemas.microsoft.com/office/powerpoint/2010/main" val="31210940"/>
+        <p14:creationId xmlns:p14="http://schemas.microsoft.com/office/powerpoint/2010/main" val="2004901209"/>
       </p:ext>
     </p:extLst>
   </p:cSld>
@@ -4484,501 +5342,55 @@
           <a:chExt cx="0" cy="0"/>
         </a:xfrm>
       </p:grpSpPr>
-      <p:cxnSp>
-        <p:nvCxnSpPr>
-          <p:cNvPr id="14" name="Straight Arrow Connector 13">
-            <a:extLst>
-              <a:ext uri="{FF2B5EF4-FFF2-40B4-BE49-F238E27FC236}">
-                <a16:creationId xmlns:a16="http://schemas.microsoft.com/office/drawing/2014/main" id="{938023AD-2B37-44B5-B895-08923EA07627}"/>
-              </a:ext>
-            </a:extLst>
-          </p:cNvPr>
-          <p:cNvCxnSpPr>
-            <a:cxnSpLocks/>
-          </p:cNvCxnSpPr>
-          <p:nvPr/>
-        </p:nvCxnSpPr>
-        <p:spPr>
-          <a:xfrm flipH="1">
-            <a:off x="9866891" y="3558850"/>
-            <a:ext cx="1331" cy="3221711"/>
-          </a:xfrm>
-          <a:prstGeom prst="straightConnector1">
-            <a:avLst/>
-          </a:prstGeom>
-        </p:spPr>
-        <p:style>
-          <a:lnRef idx="2">
-            <a:schemeClr val="dk1"/>
-          </a:lnRef>
-          <a:fillRef idx="0">
-            <a:schemeClr val="dk1"/>
-          </a:fillRef>
-          <a:effectRef idx="1">
-            <a:schemeClr val="dk1"/>
-          </a:effectRef>
-          <a:fontRef idx="minor">
-            <a:schemeClr val="tx1"/>
-          </a:fontRef>
-        </p:style>
-      </p:cxnSp>
-      <p:cxnSp>
-        <p:nvCxnSpPr>
-          <p:cNvPr id="15" name="Straight Arrow Connector 14">
-            <a:extLst>
-              <a:ext uri="{FF2B5EF4-FFF2-40B4-BE49-F238E27FC236}">
-                <a16:creationId xmlns:a16="http://schemas.microsoft.com/office/drawing/2014/main" id="{E58D0140-56C9-42E6-B2EE-685806EB7765}"/>
-              </a:ext>
-            </a:extLst>
-          </p:cNvPr>
-          <p:cNvCxnSpPr>
-            <a:cxnSpLocks/>
-          </p:cNvCxnSpPr>
-          <p:nvPr/>
-        </p:nvCxnSpPr>
-        <p:spPr>
-          <a:xfrm flipH="1">
-            <a:off x="8141593" y="5180022"/>
-            <a:ext cx="3424664" cy="0"/>
-          </a:xfrm>
-          <a:prstGeom prst="straightConnector1">
-            <a:avLst/>
-          </a:prstGeom>
-        </p:spPr>
-        <p:style>
-          <a:lnRef idx="2">
-            <a:schemeClr val="dk1"/>
-          </a:lnRef>
-          <a:fillRef idx="0">
-            <a:schemeClr val="dk1"/>
-          </a:fillRef>
-          <a:effectRef idx="1">
-            <a:schemeClr val="dk1"/>
-          </a:effectRef>
-          <a:fontRef idx="minor">
-            <a:schemeClr val="tx1"/>
-          </a:fontRef>
-        </p:style>
-      </p:cxnSp>
-      <p:sp>
-        <p:nvSpPr>
-          <p:cNvPr id="17" name="Flowchart: Decision 16">
-            <a:extLst>
-              <a:ext uri="{FF2B5EF4-FFF2-40B4-BE49-F238E27FC236}">
-                <a16:creationId xmlns:a16="http://schemas.microsoft.com/office/drawing/2014/main" id="{D1D937C6-6960-44AF-B040-E59F354A795B}"/>
-              </a:ext>
-            </a:extLst>
-          </p:cNvPr>
-          <p:cNvSpPr/>
-          <p:nvPr/>
-        </p:nvSpPr>
-        <p:spPr>
-          <a:xfrm>
-            <a:off x="8573184" y="4365886"/>
-            <a:ext cx="2620073" cy="1642147"/>
-          </a:xfrm>
-          <a:prstGeom prst="flowChartDecision">
-            <a:avLst/>
-          </a:prstGeom>
-        </p:spPr>
-        <p:style>
-          <a:lnRef idx="2">
-            <a:schemeClr val="dk1"/>
-          </a:lnRef>
-          <a:fillRef idx="1">
-            <a:schemeClr val="lt1"/>
-          </a:fillRef>
-          <a:effectRef idx="0">
-            <a:schemeClr val="dk1"/>
-          </a:effectRef>
-          <a:fontRef idx="minor">
-            <a:schemeClr val="dk1"/>
-          </a:fontRef>
-        </p:style>
-        <p:txBody>
-          <a:bodyPr rtlCol="0" anchor="ctr"/>
-          <a:lstStyle/>
-          <a:p>
-            <a:pPr algn="ctr"/>
-            <a:endParaRPr lang="en-US"/>
-          </a:p>
-        </p:txBody>
-      </p:sp>
-      <p:sp>
-        <p:nvSpPr>
-          <p:cNvPr id="8" name="TextBox 7">
-            <a:extLst>
-              <a:ext uri="{FF2B5EF4-FFF2-40B4-BE49-F238E27FC236}">
-                <a16:creationId xmlns:a16="http://schemas.microsoft.com/office/drawing/2014/main" id="{A1FE880C-F705-4886-9AAC-8FAA2693A52F}"/>
-              </a:ext>
-            </a:extLst>
-          </p:cNvPr>
-          <p:cNvSpPr txBox="1"/>
-          <p:nvPr/>
-        </p:nvSpPr>
-        <p:spPr>
-          <a:xfrm>
-            <a:off x="8828948" y="4809693"/>
-            <a:ext cx="2099836" cy="707886"/>
-          </a:xfrm>
-          <a:prstGeom prst="rect">
-            <a:avLst/>
-          </a:prstGeom>
-          <a:noFill/>
-        </p:spPr>
-        <p:txBody>
-          <a:bodyPr wrap="square" rtlCol="0">
-            <a:spAutoFit/>
-          </a:bodyPr>
-          <a:lstStyle/>
-          <a:p>
-            <a:pPr algn="ctr"/>
-            <a:r>
-              <a:rPr lang="en-US" sz="4000" dirty="0"/>
-              <a:t>REPEAT</a:t>
-            </a:r>
-          </a:p>
-        </p:txBody>
-      </p:sp>
-      <p:cxnSp>
-        <p:nvCxnSpPr>
-          <p:cNvPr id="10" name="Straight Arrow Connector 9">
-            <a:extLst>
-              <a:ext uri="{FF2B5EF4-FFF2-40B4-BE49-F238E27FC236}">
-                <a16:creationId xmlns:a16="http://schemas.microsoft.com/office/drawing/2014/main" id="{AC56CD81-4840-4771-BA5C-A4F543DA9A00}"/>
-              </a:ext>
-            </a:extLst>
-          </p:cNvPr>
-          <p:cNvCxnSpPr>
-            <a:cxnSpLocks/>
-          </p:cNvCxnSpPr>
-          <p:nvPr/>
-        </p:nvCxnSpPr>
-        <p:spPr>
-          <a:xfrm flipH="1">
-            <a:off x="10019291" y="102755"/>
-            <a:ext cx="1331" cy="3221711"/>
-          </a:xfrm>
-          <a:prstGeom prst="straightConnector1">
-            <a:avLst/>
-          </a:prstGeom>
-        </p:spPr>
-        <p:style>
-          <a:lnRef idx="2">
-            <a:schemeClr val="dk1"/>
-          </a:lnRef>
-          <a:fillRef idx="0">
-            <a:schemeClr val="dk1"/>
-          </a:fillRef>
-          <a:effectRef idx="1">
-            <a:schemeClr val="dk1"/>
-          </a:effectRef>
-          <a:fontRef idx="minor">
-            <a:schemeClr val="tx1"/>
-          </a:fontRef>
-        </p:style>
-      </p:cxnSp>
-      <p:cxnSp>
-        <p:nvCxnSpPr>
-          <p:cNvPr id="12" name="Straight Arrow Connector 11">
-            <a:extLst>
-              <a:ext uri="{FF2B5EF4-FFF2-40B4-BE49-F238E27FC236}">
-                <a16:creationId xmlns:a16="http://schemas.microsoft.com/office/drawing/2014/main" id="{D888D8D7-8BF4-4B31-B0E7-F4387A8129FA}"/>
-              </a:ext>
-            </a:extLst>
-          </p:cNvPr>
-          <p:cNvCxnSpPr>
-            <a:cxnSpLocks/>
-          </p:cNvCxnSpPr>
-          <p:nvPr/>
-        </p:nvCxnSpPr>
-        <p:spPr>
-          <a:xfrm flipH="1">
-            <a:off x="8293993" y="1723927"/>
-            <a:ext cx="3424664" cy="0"/>
-          </a:xfrm>
-          <a:prstGeom prst="straightConnector1">
-            <a:avLst/>
-          </a:prstGeom>
-        </p:spPr>
-        <p:style>
-          <a:lnRef idx="2">
-            <a:schemeClr val="dk1"/>
-          </a:lnRef>
-          <a:fillRef idx="0">
-            <a:schemeClr val="dk1"/>
-          </a:fillRef>
-          <a:effectRef idx="1">
-            <a:schemeClr val="dk1"/>
-          </a:effectRef>
-          <a:fontRef idx="minor">
-            <a:schemeClr val="tx1"/>
-          </a:fontRef>
-        </p:style>
-      </p:cxnSp>
-      <p:sp>
-        <p:nvSpPr>
-          <p:cNvPr id="13" name="Flowchart: Decision 12">
-            <a:extLst>
-              <a:ext uri="{FF2B5EF4-FFF2-40B4-BE49-F238E27FC236}">
-                <a16:creationId xmlns:a16="http://schemas.microsoft.com/office/drawing/2014/main" id="{18E19241-8C7C-4318-9D68-6087431F5122}"/>
-              </a:ext>
-            </a:extLst>
-          </p:cNvPr>
-          <p:cNvSpPr/>
-          <p:nvPr/>
-        </p:nvSpPr>
-        <p:spPr>
-          <a:xfrm>
-            <a:off x="8725584" y="909791"/>
-            <a:ext cx="2620073" cy="1642147"/>
-          </a:xfrm>
-          <a:prstGeom prst="flowChartDecision">
-            <a:avLst/>
-          </a:prstGeom>
-        </p:spPr>
-        <p:style>
-          <a:lnRef idx="2">
-            <a:schemeClr val="dk1"/>
-          </a:lnRef>
-          <a:fillRef idx="1">
-            <a:schemeClr val="lt1"/>
-          </a:fillRef>
-          <a:effectRef idx="0">
-            <a:schemeClr val="dk1"/>
-          </a:effectRef>
-          <a:fontRef idx="minor">
-            <a:schemeClr val="dk1"/>
-          </a:fontRef>
-        </p:style>
-        <p:txBody>
-          <a:bodyPr rtlCol="0" anchor="ctr"/>
-          <a:lstStyle/>
-          <a:p>
-            <a:pPr algn="ctr"/>
-            <a:endParaRPr lang="en-US"/>
-          </a:p>
-        </p:txBody>
-      </p:sp>
-      <p:sp>
-        <p:nvSpPr>
-          <p:cNvPr id="19" name="TextBox 18">
-            <a:extLst>
-              <a:ext uri="{FF2B5EF4-FFF2-40B4-BE49-F238E27FC236}">
-                <a16:creationId xmlns:a16="http://schemas.microsoft.com/office/drawing/2014/main" id="{200BE565-B3F8-40EE-9998-7AE99F1434C2}"/>
-              </a:ext>
-            </a:extLst>
-          </p:cNvPr>
-          <p:cNvSpPr txBox="1"/>
-          <p:nvPr/>
-        </p:nvSpPr>
-        <p:spPr>
-          <a:xfrm>
-            <a:off x="8981348" y="1353598"/>
-            <a:ext cx="2099836" cy="707886"/>
-          </a:xfrm>
-          <a:prstGeom prst="rect">
-            <a:avLst/>
-          </a:prstGeom>
-          <a:noFill/>
-        </p:spPr>
-        <p:txBody>
-          <a:bodyPr wrap="square" rtlCol="0">
-            <a:spAutoFit/>
-          </a:bodyPr>
-          <a:lstStyle/>
-          <a:p>
-            <a:pPr algn="ctr"/>
-            <a:r>
-              <a:rPr lang="en-US" sz="4000" dirty="0"/>
-              <a:t>WHILE</a:t>
-            </a:r>
-          </a:p>
-        </p:txBody>
-      </p:sp>
-      <p:sp>
-        <p:nvSpPr>
-          <p:cNvPr id="33" name="TextBox 32">
-            <a:extLst>
-              <a:ext uri="{FF2B5EF4-FFF2-40B4-BE49-F238E27FC236}">
-                <a16:creationId xmlns:a16="http://schemas.microsoft.com/office/drawing/2014/main" id="{87DD249F-2525-48A0-943C-60F35EE8409F}"/>
-              </a:ext>
-            </a:extLst>
-          </p:cNvPr>
-          <p:cNvSpPr txBox="1"/>
-          <p:nvPr/>
-        </p:nvSpPr>
-        <p:spPr>
-          <a:xfrm>
-            <a:off x="5419349" y="4365886"/>
-            <a:ext cx="1828800" cy="707886"/>
-          </a:xfrm>
-          <a:prstGeom prst="rect">
-            <a:avLst/>
-          </a:prstGeom>
-        </p:spPr>
-        <p:style>
-          <a:lnRef idx="2">
-            <a:schemeClr val="dk1"/>
-          </a:lnRef>
-          <a:fillRef idx="1">
-            <a:schemeClr val="lt1"/>
-          </a:fillRef>
-          <a:effectRef idx="0">
-            <a:schemeClr val="dk1"/>
-          </a:effectRef>
-          <a:fontRef idx="minor">
-            <a:schemeClr val="dk1"/>
-          </a:fontRef>
-        </p:style>
-        <p:txBody>
-          <a:bodyPr wrap="square" rtlCol="0">
-            <a:spAutoFit/>
-          </a:bodyPr>
-          <a:lstStyle/>
-          <a:p>
-            <a:r>
-              <a:rPr lang="en-US" sz="4000" dirty="0"/>
-              <a:t>SYSYEM</a:t>
-            </a:r>
-          </a:p>
-        </p:txBody>
-      </p:sp>
-      <p:cxnSp>
-        <p:nvCxnSpPr>
-          <p:cNvPr id="2" name="Straight Arrow Connector 1">
-            <a:extLst>
-              <a:ext uri="{FF2B5EF4-FFF2-40B4-BE49-F238E27FC236}">
-                <a16:creationId xmlns:a16="http://schemas.microsoft.com/office/drawing/2014/main" id="{B02FBAB0-6470-4907-8A1A-29B2A8303212}"/>
-              </a:ext>
-            </a:extLst>
-          </p:cNvPr>
-          <p:cNvCxnSpPr>
-            <a:cxnSpLocks/>
-          </p:cNvCxnSpPr>
-          <p:nvPr/>
-        </p:nvCxnSpPr>
-        <p:spPr>
-          <a:xfrm>
-            <a:off x="473343" y="1744522"/>
-            <a:ext cx="4215888" cy="0"/>
-          </a:xfrm>
-          <a:prstGeom prst="straightConnector1">
-            <a:avLst/>
-          </a:prstGeom>
-          <a:ln>
-            <a:tailEnd type="triangle"/>
-          </a:ln>
-        </p:spPr>
-        <p:style>
-          <a:lnRef idx="3">
-            <a:schemeClr val="dk1"/>
-          </a:lnRef>
-          <a:fillRef idx="0">
-            <a:schemeClr val="dk1"/>
-          </a:fillRef>
-          <a:effectRef idx="2">
-            <a:schemeClr val="dk1"/>
-          </a:effectRef>
-          <a:fontRef idx="minor">
-            <a:schemeClr val="tx1"/>
-          </a:fontRef>
-        </p:style>
-      </p:cxnSp>
-      <p:sp>
-        <p:nvSpPr>
-          <p:cNvPr id="5" name="TextBox 4">
-            <a:extLst>
-              <a:ext uri="{FF2B5EF4-FFF2-40B4-BE49-F238E27FC236}">
-                <a16:creationId xmlns:a16="http://schemas.microsoft.com/office/drawing/2014/main" id="{1F66AD56-E184-47FE-91B6-E59458763E70}"/>
-              </a:ext>
-            </a:extLst>
-          </p:cNvPr>
-          <p:cNvSpPr txBox="1"/>
-          <p:nvPr/>
-        </p:nvSpPr>
-        <p:spPr>
-          <a:xfrm>
-            <a:off x="941510" y="923177"/>
-            <a:ext cx="3314786" cy="707886"/>
-          </a:xfrm>
-          <a:prstGeom prst="rect">
-            <a:avLst/>
-          </a:prstGeom>
-          <a:ln>
-            <a:noFill/>
-          </a:ln>
-        </p:spPr>
-        <p:style>
-          <a:lnRef idx="2">
-            <a:schemeClr val="dk1"/>
-          </a:lnRef>
-          <a:fillRef idx="1">
-            <a:schemeClr val="lt1"/>
-          </a:fillRef>
-          <a:effectRef idx="0">
-            <a:schemeClr val="dk1"/>
-          </a:effectRef>
-          <a:fontRef idx="minor">
-            <a:schemeClr val="dk1"/>
-          </a:fontRef>
-        </p:style>
-        <p:txBody>
-          <a:bodyPr wrap="square" rtlCol="0">
-            <a:spAutoFit/>
-          </a:bodyPr>
-          <a:lstStyle/>
-          <a:p>
-            <a:pPr algn="ctr"/>
-            <a:r>
-              <a:rPr lang="en-US" sz="4000" dirty="0"/>
-              <a:t>MSG(OBJECT)</a:t>
-            </a:r>
-          </a:p>
-        </p:txBody>
-      </p:sp>
-      <p:sp>
-        <p:nvSpPr>
-          <p:cNvPr id="7" name="Isosceles Triangle 6">
-            <a:extLst>
-              <a:ext uri="{FF2B5EF4-FFF2-40B4-BE49-F238E27FC236}">
-                <a16:creationId xmlns:a16="http://schemas.microsoft.com/office/drawing/2014/main" id="{E0436FA0-7B35-4F39-8E1F-D84A2C2008FE}"/>
-              </a:ext>
-            </a:extLst>
-          </p:cNvPr>
-          <p:cNvSpPr/>
-          <p:nvPr/>
-        </p:nvSpPr>
-        <p:spPr>
-          <a:xfrm rot="5400000">
-            <a:off x="4513256" y="1510122"/>
-            <a:ext cx="707886" cy="489593"/>
-          </a:xfrm>
-          <a:prstGeom prst="triangle">
-            <a:avLst/>
-          </a:prstGeom>
-        </p:spPr>
-        <p:style>
-          <a:lnRef idx="2">
-            <a:schemeClr val="dk1">
-              <a:shade val="50000"/>
-            </a:schemeClr>
-          </a:lnRef>
-          <a:fillRef idx="1">
-            <a:schemeClr val="dk1"/>
-          </a:fillRef>
-          <a:effectRef idx="0">
-            <a:schemeClr val="dk1"/>
-          </a:effectRef>
-          <a:fontRef idx="minor">
-            <a:schemeClr val="lt1"/>
-          </a:fontRef>
-        </p:style>
-        <p:txBody>
-          <a:bodyPr rtlCol="0" anchor="ctr"/>
-          <a:lstStyle/>
-          <a:p>
-            <a:pPr algn="ctr"/>
+      <p:sp>
+        <p:nvSpPr>
+          <p:cNvPr id="2" name="Title 1">
+            <a:extLst>
+              <a:ext uri="{FF2B5EF4-FFF2-40B4-BE49-F238E27FC236}">
+                <a16:creationId xmlns:a16="http://schemas.microsoft.com/office/drawing/2014/main" id="{84476ED7-5B72-43DB-ADD7-4D5A3575BD5C}"/>
+              </a:ext>
+            </a:extLst>
+          </p:cNvPr>
+          <p:cNvSpPr>
+            <a:spLocks noGrp="1"/>
+          </p:cNvSpPr>
+          <p:nvPr>
+            <p:ph type="title"/>
+          </p:nvPr>
+        </p:nvSpPr>
+        <p:spPr/>
+        <p:txBody>
+          <a:bodyPr/>
+          <a:lstStyle/>
+          <a:p>
+            <a:r>
+              <a:rPr lang="en-US" dirty="0"/>
+              <a:t>Detailed</a:t>
+            </a:r>
+          </a:p>
+        </p:txBody>
+      </p:sp>
+      <p:sp>
+        <p:nvSpPr>
+          <p:cNvPr id="3" name="Text Placeholder 2">
+            <a:extLst>
+              <a:ext uri="{FF2B5EF4-FFF2-40B4-BE49-F238E27FC236}">
+                <a16:creationId xmlns:a16="http://schemas.microsoft.com/office/drawing/2014/main" id="{7EA0A255-6E1C-47AC-96A7-ECCCD8D608F2}"/>
+              </a:ext>
+            </a:extLst>
+          </p:cNvPr>
+          <p:cNvSpPr>
+            <a:spLocks noGrp="1"/>
+          </p:cNvSpPr>
+          <p:nvPr>
+            <p:ph type="body" idx="1"/>
+          </p:nvPr>
+        </p:nvSpPr>
+        <p:spPr/>
+        <p:txBody>
+          <a:bodyPr/>
+          <a:lstStyle/>
+          <a:p>
             <a:endParaRPr lang="en-US"/>
           </a:p>
         </p:txBody>
@@ -4986,7 +5398,7 @@
     </p:spTree>
     <p:extLst>
       <p:ext uri="{BB962C8B-B14F-4D97-AF65-F5344CB8AC3E}">
-        <p14:creationId xmlns:p14="http://schemas.microsoft.com/office/powerpoint/2010/main" val="3275622678"/>
+        <p14:creationId xmlns:p14="http://schemas.microsoft.com/office/powerpoint/2010/main" val="1470719305"/>
       </p:ext>
     </p:extLst>
   </p:cSld>
@@ -5015,10 +5427,10 @@
       </p:grpSpPr>
       <p:pic>
         <p:nvPicPr>
-          <p:cNvPr id="10" name="Picture 10">
-            <a:extLst>
-              <a:ext uri="{FF2B5EF4-FFF2-40B4-BE49-F238E27FC236}">
-                <a16:creationId xmlns:a16="http://schemas.microsoft.com/office/drawing/2014/main" id="{CFD107E3-4C74-4B10-931E-72CD9D8CE921}"/>
+          <p:cNvPr id="6" name="Picture 5">
+            <a:extLst>
+              <a:ext uri="{FF2B5EF4-FFF2-40B4-BE49-F238E27FC236}">
+                <a16:creationId xmlns:a16="http://schemas.microsoft.com/office/drawing/2014/main" id="{8AE9B8B4-D7D7-46AC-9648-BA92763CD8DF}"/>
               </a:ext>
             </a:extLst>
           </p:cNvPr>
@@ -5028,33 +5440,57 @@
           <p:nvPr/>
         </p:nvPicPr>
         <p:blipFill>
-          <a:blip r:embed="rId2">
-            <a:extLst>
-              <a:ext uri="{28A0092B-C50C-407E-A947-70E740481C1C}">
-                <a14:useLocalDpi xmlns:a14="http://schemas.microsoft.com/office/drawing/2010/main" val="0"/>
-              </a:ext>
-            </a:extLst>
-          </a:blip>
+          <a:blip r:embed="rId2"/>
           <a:stretch>
             <a:fillRect/>
           </a:stretch>
         </p:blipFill>
         <p:spPr>
           <a:xfrm>
-            <a:off x="5914838" y="1362443"/>
-            <a:ext cx="3074526" cy="3074526"/>
+            <a:off x="454925" y="284328"/>
+            <a:ext cx="10974201" cy="6470924"/>
           </a:xfrm>
           <a:prstGeom prst="rect">
             <a:avLst/>
           </a:prstGeom>
         </p:spPr>
       </p:pic>
+    </p:spTree>
+    <p:extLst>
+      <p:ext uri="{BB962C8B-B14F-4D97-AF65-F5344CB8AC3E}">
+        <p14:creationId xmlns:p14="http://schemas.microsoft.com/office/powerpoint/2010/main" val="3294991747"/>
+      </p:ext>
+    </p:extLst>
+  </p:cSld>
+  <p:clrMapOvr>
+    <a:masterClrMapping/>
+  </p:clrMapOvr>
+</p:sld>
+</file>
+
+<file path=ppt/slides/slide8.xml><?xml version="1.0" encoding="utf-8"?>
+<p:sld xmlns:a="http://schemas.openxmlformats.org/drawingml/2006/main" xmlns:r="http://schemas.openxmlformats.org/officeDocument/2006/relationships" xmlns:p="http://schemas.openxmlformats.org/presentationml/2006/main">
+  <p:cSld>
+    <p:spTree>
+      <p:nvGrpSpPr>
+        <p:cNvPr id="1" name=""/>
+        <p:cNvGrpSpPr/>
+        <p:nvPr/>
+      </p:nvGrpSpPr>
+      <p:grpSpPr>
+        <a:xfrm>
+          <a:off x="0" y="0"/>
+          <a:ext cx="0" cy="0"/>
+          <a:chOff x="0" y="0"/>
+          <a:chExt cx="0" cy="0"/>
+        </a:xfrm>
+      </p:grpSpPr>
       <p:pic>
         <p:nvPicPr>
-          <p:cNvPr id="5" name="Picture 2">
-            <a:extLst>
-              <a:ext uri="{FF2B5EF4-FFF2-40B4-BE49-F238E27FC236}">
-                <a16:creationId xmlns:a16="http://schemas.microsoft.com/office/drawing/2014/main" id="{E73FF380-DA72-4FC3-9D28-88185AFC535A}"/>
+          <p:cNvPr id="7" name="Picture 6">
+            <a:extLst>
+              <a:ext uri="{FF2B5EF4-FFF2-40B4-BE49-F238E27FC236}">
+                <a16:creationId xmlns:a16="http://schemas.microsoft.com/office/drawing/2014/main" id="{BF67A69E-0738-44B3-8D36-D05D1DA89F5B}"/>
               </a:ext>
             </a:extLst>
           </p:cNvPr>
@@ -5064,33 +5500,57 @@
           <p:nvPr/>
         </p:nvPicPr>
         <p:blipFill>
-          <a:blip r:embed="rId3">
-            <a:extLst>
-              <a:ext uri="{28A0092B-C50C-407E-A947-70E740481C1C}">
-                <a14:useLocalDpi xmlns:a14="http://schemas.microsoft.com/office/drawing/2010/main" val="0"/>
-              </a:ext>
-            </a:extLst>
-          </a:blip>
+          <a:blip r:embed="rId2"/>
           <a:stretch>
             <a:fillRect/>
           </a:stretch>
         </p:blipFill>
         <p:spPr>
           <a:xfrm>
-            <a:off x="279788" y="119843"/>
-            <a:ext cx="3744617" cy="3744617"/>
+            <a:off x="2666156" y="305122"/>
+            <a:ext cx="5900658" cy="6247755"/>
           </a:xfrm>
           <a:prstGeom prst="rect">
             <a:avLst/>
           </a:prstGeom>
         </p:spPr>
       </p:pic>
+    </p:spTree>
+    <p:extLst>
+      <p:ext uri="{BB962C8B-B14F-4D97-AF65-F5344CB8AC3E}">
+        <p14:creationId xmlns:p14="http://schemas.microsoft.com/office/powerpoint/2010/main" val="1160830767"/>
+      </p:ext>
+    </p:extLst>
+  </p:cSld>
+  <p:clrMapOvr>
+    <a:masterClrMapping/>
+  </p:clrMapOvr>
+</p:sld>
+</file>
+
+<file path=ppt/slides/slide9.xml><?xml version="1.0" encoding="utf-8"?>
+<p:sld xmlns:a="http://schemas.openxmlformats.org/drawingml/2006/main" xmlns:r="http://schemas.openxmlformats.org/officeDocument/2006/relationships" xmlns:p="http://schemas.openxmlformats.org/presentationml/2006/main">
+  <p:cSld>
+    <p:spTree>
+      <p:nvGrpSpPr>
+        <p:cNvPr id="1" name=""/>
+        <p:cNvGrpSpPr/>
+        <p:nvPr/>
+      </p:nvGrpSpPr>
+      <p:grpSpPr>
+        <a:xfrm>
+          <a:off x="0" y="0"/>
+          <a:ext cx="0" cy="0"/>
+          <a:chOff x="0" y="0"/>
+          <a:chExt cx="0" cy="0"/>
+        </a:xfrm>
+      </p:grpSpPr>
       <p:pic>
         <p:nvPicPr>
-          <p:cNvPr id="7" name="Picture 3">
-            <a:extLst>
-              <a:ext uri="{FF2B5EF4-FFF2-40B4-BE49-F238E27FC236}">
-                <a16:creationId xmlns:a16="http://schemas.microsoft.com/office/drawing/2014/main" id="{B06C5FDC-E008-498A-80A2-04DF225746FB}"/>
+          <p:cNvPr id="4" name="Picture 3">
+            <a:extLst>
+              <a:ext uri="{FF2B5EF4-FFF2-40B4-BE49-F238E27FC236}">
+                <a16:creationId xmlns:a16="http://schemas.microsoft.com/office/drawing/2014/main" id="{2F0DEFFB-6206-4CA6-A560-9963EA839B26}"/>
               </a:ext>
             </a:extLst>
           </p:cNvPr>
@@ -5100,93 +5560,15 @@
           <p:nvPr/>
         </p:nvPicPr>
         <p:blipFill>
-          <a:blip r:embed="rId4">
-            <a:extLst>
-              <a:ext uri="{28A0092B-C50C-407E-A947-70E740481C1C}">
-                <a14:useLocalDpi xmlns:a14="http://schemas.microsoft.com/office/drawing/2010/main" val="0"/>
-              </a:ext>
-            </a:extLst>
-          </a:blip>
+          <a:blip r:embed="rId2"/>
           <a:stretch>
             <a:fillRect/>
           </a:stretch>
         </p:blipFill>
         <p:spPr>
           <a:xfrm>
-            <a:off x="2705882" y="1362443"/>
-            <a:ext cx="1193109" cy="1193109"/>
-          </a:xfrm>
-          <a:prstGeom prst="rect">
-            <a:avLst/>
-          </a:prstGeom>
-        </p:spPr>
-      </p:pic>
-      <p:pic>
-        <p:nvPicPr>
-          <p:cNvPr id="11" name="Picture 11">
-            <a:extLst>
-              <a:ext uri="{FF2B5EF4-FFF2-40B4-BE49-F238E27FC236}">
-                <a16:creationId xmlns:a16="http://schemas.microsoft.com/office/drawing/2014/main" id="{CEA91D39-2448-48D7-8A68-753A91CE94C1}"/>
-              </a:ext>
-            </a:extLst>
-          </p:cNvPr>
-          <p:cNvPicPr>
-            <a:picLocks noChangeAspect="1"/>
-          </p:cNvPicPr>
-          <p:nvPr/>
-        </p:nvPicPr>
-        <p:blipFill>
-          <a:blip r:embed="rId5">
-            <a:extLst>
-              <a:ext uri="{28A0092B-C50C-407E-A947-70E740481C1C}">
-                <a14:useLocalDpi xmlns:a14="http://schemas.microsoft.com/office/drawing/2010/main" val="0"/>
-              </a:ext>
-            </a:extLst>
-          </a:blip>
-          <a:stretch>
-            <a:fillRect/>
-          </a:stretch>
-        </p:blipFill>
-        <p:spPr>
-          <a:xfrm>
-            <a:off x="2248176" y="3746337"/>
-            <a:ext cx="2721445" cy="2721445"/>
-          </a:xfrm>
-          <a:prstGeom prst="rect">
-            <a:avLst/>
-          </a:prstGeom>
-        </p:spPr>
-      </p:pic>
-      <p:pic>
-        <p:nvPicPr>
-          <p:cNvPr id="3" name="Picture 3">
-            <a:extLst>
-              <a:ext uri="{FF2B5EF4-FFF2-40B4-BE49-F238E27FC236}">
-                <a16:creationId xmlns:a16="http://schemas.microsoft.com/office/drawing/2014/main" id="{8981669B-05E0-4947-BEA0-FD0280CC7C2B}"/>
-              </a:ext>
-            </a:extLst>
-          </p:cNvPr>
-          <p:cNvPicPr>
-            <a:picLocks noChangeAspect="1"/>
-          </p:cNvPicPr>
-          <p:nvPr/>
-        </p:nvPicPr>
-        <p:blipFill>
-          <a:blip r:embed="rId4">
-            <a:extLst>
-              <a:ext uri="{28A0092B-C50C-407E-A947-70E740481C1C}">
-                <a14:useLocalDpi xmlns:a14="http://schemas.microsoft.com/office/drawing/2010/main" val="0"/>
-              </a:ext>
-            </a:extLst>
-          </a:blip>
-          <a:stretch>
-            <a:fillRect/>
-          </a:stretch>
-        </p:blipFill>
-        <p:spPr>
-          <a:xfrm>
-            <a:off x="3115877" y="4436969"/>
-            <a:ext cx="986041" cy="986041"/>
+            <a:off x="3481387" y="1252537"/>
+            <a:ext cx="5229225" cy="4352925"/>
           </a:xfrm>
           <a:prstGeom prst="rect">
             <a:avLst/>
@@ -5196,7 +5578,7 @@
     </p:spTree>
     <p:extLst>
       <p:ext uri="{BB962C8B-B14F-4D97-AF65-F5344CB8AC3E}">
-        <p14:creationId xmlns:p14="http://schemas.microsoft.com/office/powerpoint/2010/main" val="1051890245"/>
+        <p14:creationId xmlns:p14="http://schemas.microsoft.com/office/powerpoint/2010/main" val="283828662"/>
       </p:ext>
     </p:extLst>
   </p:cSld>

</xml_diff>